<commit_message>
updated tech slides for javaone
</commit_message>
<xml_diff>
--- a/ez18n-slides/javaone-2012/ez18n_javaone2012_tech.pptx
+++ b/ez18n-slides/javaone-2012/ez18n_javaone2012_tech.pptx
@@ -5,12 +5,12 @@
     <p:sldMasterId id="2147483648" r:id="rId1"/>
   </p:sldMasterIdLst>
   <p:handoutMasterIdLst>
-    <p:handoutMasterId r:id="rId12"/>
+    <p:handoutMasterId r:id="rId13"/>
   </p:handoutMasterIdLst>
   <p:sldIdLst>
-    <p:sldId id="288" r:id="rId2"/>
+    <p:sldId id="289" r:id="rId2"/>
     <p:sldId id="287" r:id="rId3"/>
-    <p:sldId id="289" r:id="rId4"/>
+    <p:sldId id="288" r:id="rId4"/>
     <p:sldId id="290" r:id="rId5"/>
     <p:sldId id="291" r:id="rId6"/>
     <p:sldId id="292" r:id="rId7"/>
@@ -18,6 +18,7 @@
     <p:sldId id="294" r:id="rId9"/>
     <p:sldId id="295" r:id="rId10"/>
     <p:sldId id="296" r:id="rId11"/>
+    <p:sldId id="297" r:id="rId12"/>
   </p:sldIdLst>
   <p:sldSz cx="9144000" cy="6858000" type="screen4x3"/>
   <p:notesSz cx="9305925" cy="7019925"/>
@@ -3376,681 +3377,12 @@
           <a:lstStyle/>
           <a:p>
             <a:r>
+              <a:rPr lang="en-US" dirty="0"/>
+              <a:t>Ez18n - Getting </a:t>
+            </a:r>
+            <a:r>
               <a:rPr lang="en-US" dirty="0" smtClean="0"/>
-              <a:t>APT chaining</a:t>
-            </a:r>
-            <a:endParaRPr lang="en-US" dirty="0"/>
-          </a:p>
-        </p:txBody>
-      </p:sp>
-      <p:pic>
-        <p:nvPicPr>
-          <p:cNvPr id="1027" name="Picture 3"/>
-          <p:cNvPicPr>
-            <a:picLocks noChangeAspect="1" noChangeArrowheads="1"/>
-          </p:cNvPicPr>
-          <p:nvPr/>
-        </p:nvPicPr>
-        <p:blipFill>
-          <a:blip r:embed="rId2">
-            <a:extLst>
-              <a:ext uri="{28A0092B-C50C-407E-A947-70E740481C1C}">
-                <a14:useLocalDpi xmlns:a14="http://schemas.microsoft.com/office/drawing/2010/main" val="0"/>
-              </a:ext>
-            </a:extLst>
-          </a:blip>
-          <a:srcRect/>
-          <a:stretch>
-            <a:fillRect/>
-          </a:stretch>
-        </p:blipFill>
-        <p:spPr bwMode="auto">
-          <a:xfrm>
-            <a:off x="436970" y="2313737"/>
-            <a:ext cx="7183030" cy="3782263"/>
-          </a:xfrm>
-          <a:prstGeom prst="rect">
-            <a:avLst/>
-          </a:prstGeom>
-          <a:noFill/>
-          <a:ln>
-            <a:noFill/>
-          </a:ln>
-          <a:effectLst/>
-          <a:extLst>
-            <a:ext uri="{909E8E84-426E-40DD-AFC4-6F175D3DCCD1}">
-              <a14:hiddenFill xmlns:a14="http://schemas.microsoft.com/office/drawing/2010/main">
-                <a:solidFill>
-                  <a:schemeClr val="accent1"/>
-                </a:solidFill>
-              </a14:hiddenFill>
-            </a:ext>
-            <a:ext uri="{91240B29-F687-4F45-9708-019B960494DF}">
-              <a14:hiddenLine xmlns:a14="http://schemas.microsoft.com/office/drawing/2010/main" w="9525">
-                <a:solidFill>
-                  <a:schemeClr val="tx1"/>
-                </a:solidFill>
-                <a:miter lim="800000"/>
-                <a:headEnd/>
-                <a:tailEnd/>
-              </a14:hiddenLine>
-            </a:ext>
-            <a:ext uri="{AF507438-7753-43E0-B8FC-AC1667EBCBE1}">
-              <a14:hiddenEffects xmlns:a14="http://schemas.microsoft.com/office/drawing/2010/main">
-                <a:effectLst>
-                  <a:outerShdw dist="35921" dir="2700000" algn="ctr" rotWithShape="0">
-                    <a:schemeClr val="bg2"/>
-                  </a:outerShdw>
-                </a:effectLst>
-              </a14:hiddenEffects>
-            </a:ext>
-          </a:extLst>
-        </p:spPr>
-      </p:pic>
-      <p:sp>
-        <p:nvSpPr>
-          <p:cNvPr id="4" name="Espace réservé du contenu 3"/>
-          <p:cNvSpPr>
-            <a:spLocks noGrp="1"/>
-          </p:cNvSpPr>
-          <p:nvPr>
-            <p:ph idx="1"/>
-          </p:nvPr>
-        </p:nvSpPr>
-        <p:spPr>
-          <a:xfrm>
-            <a:off x="4343400" y="1600200"/>
-            <a:ext cx="4343400" cy="2057399"/>
-          </a:xfrm>
-        </p:spPr>
-        <p:txBody>
-          <a:bodyPr>
-            <a:normAutofit fontScale="92500" lnSpcReduction="20000"/>
-          </a:bodyPr>
-          <a:lstStyle/>
-          <a:p>
-            <a:r>
-              <a:rPr lang="en-US" dirty="0"/>
-              <a:t>5</a:t>
-            </a:r>
-            <a:r>
-              <a:rPr lang="en-US" dirty="0" smtClean="0"/>
-              <a:t> APT processors to obtain the default pattern</a:t>
-            </a:r>
-          </a:p>
-          <a:p>
-            <a:r>
-              <a:rPr lang="en-US" dirty="0" smtClean="0"/>
-              <a:t>Optional CSV file for analysis/tooling</a:t>
-            </a:r>
-            <a:endParaRPr lang="en-US" dirty="0"/>
-          </a:p>
-        </p:txBody>
-      </p:sp>
-    </p:spTree>
-    <p:extLst>
-      <p:ext uri="{BB962C8B-B14F-4D97-AF65-F5344CB8AC3E}">
-        <p14:creationId xmlns:p14="http://schemas.microsoft.com/office/powerpoint/2010/main" val="3547187566"/>
-      </p:ext>
-    </p:extLst>
-  </p:cSld>
-  <p:clrMapOvr>
-    <a:masterClrMapping/>
-  </p:clrMapOvr>
-  <p:timing>
-    <p:tnLst>
-      <p:par>
-        <p:cTn id="1" dur="indefinite" restart="never" nodeType="tmRoot"/>
-      </p:par>
-    </p:tnLst>
-  </p:timing>
-</p:sld>
-</file>
-
-<file path=ppt/slides/slide10.xml><?xml version="1.0" encoding="utf-8"?>
-<p:sld xmlns:a="http://schemas.openxmlformats.org/drawingml/2006/main" xmlns:r="http://schemas.openxmlformats.org/officeDocument/2006/relationships" xmlns:p="http://schemas.openxmlformats.org/presentationml/2006/main">
-  <p:cSld>
-    <p:spTree>
-      <p:nvGrpSpPr>
-        <p:cNvPr id="1" name=""/>
-        <p:cNvGrpSpPr/>
-        <p:nvPr/>
-      </p:nvGrpSpPr>
-      <p:grpSpPr>
-        <a:xfrm>
-          <a:off x="0" y="0"/>
-          <a:ext cx="0" cy="0"/>
-          <a:chOff x="0" y="0"/>
-          <a:chExt cx="0" cy="0"/>
-        </a:xfrm>
-      </p:grpSpPr>
-      <p:sp>
-        <p:nvSpPr>
-          <p:cNvPr id="3" name="Espace réservé du contenu 2"/>
-          <p:cNvSpPr>
-            <a:spLocks noGrp="1"/>
-          </p:cNvSpPr>
-          <p:nvPr>
-            <p:ph idx="1"/>
-          </p:nvPr>
-        </p:nvSpPr>
-        <p:spPr>
-          <a:xfrm>
-            <a:off x="457200" y="1600201"/>
-            <a:ext cx="8229600" cy="609600"/>
-          </a:xfrm>
-        </p:spPr>
-        <p:txBody>
-          <a:bodyPr/>
-          <a:lstStyle/>
-          <a:p>
-            <a:r>
-              <a:rPr lang="en-US" dirty="0" smtClean="0"/>
-              <a:t>Some basic JUnit test using the API</a:t>
-            </a:r>
-            <a:endParaRPr lang="en-US" dirty="0"/>
-          </a:p>
-        </p:txBody>
-      </p:sp>
-      <p:sp>
-        <p:nvSpPr>
-          <p:cNvPr id="5" name="Titre 1"/>
-          <p:cNvSpPr>
-            <a:spLocks noGrp="1"/>
-          </p:cNvSpPr>
-          <p:nvPr>
-            <p:ph type="title"/>
-          </p:nvPr>
-        </p:nvSpPr>
-        <p:spPr>
-          <a:xfrm>
-            <a:off x="457200" y="274638"/>
-            <a:ext cx="8229600" cy="1143000"/>
-          </a:xfrm>
-        </p:spPr>
-        <p:txBody>
-          <a:bodyPr/>
-          <a:lstStyle/>
-          <a:p>
-            <a:r>
-              <a:rPr lang="en-US" dirty="0" smtClean="0"/>
-              <a:t>Client code sample </a:t>
-            </a:r>
-            <a:r>
-              <a:rPr lang="en-US" sz="2000" dirty="0" smtClean="0"/>
-              <a:t>(2/2)</a:t>
-            </a:r>
-            <a:endParaRPr lang="en-US" dirty="0"/>
-          </a:p>
-        </p:txBody>
-      </p:sp>
-      <p:pic>
-        <p:nvPicPr>
-          <p:cNvPr id="7171" name="Picture 3"/>
-          <p:cNvPicPr>
-            <a:picLocks noChangeAspect="1" noChangeArrowheads="1"/>
-          </p:cNvPicPr>
-          <p:nvPr/>
-        </p:nvPicPr>
-        <p:blipFill>
-          <a:blip r:embed="rId2">
-            <a:extLst>
-              <a:ext uri="{28A0092B-C50C-407E-A947-70E740481C1C}">
-                <a14:useLocalDpi xmlns:a14="http://schemas.microsoft.com/office/drawing/2010/main" val="0"/>
-              </a:ext>
-            </a:extLst>
-          </a:blip>
-          <a:srcRect/>
-          <a:stretch>
-            <a:fillRect/>
-          </a:stretch>
-        </p:blipFill>
-        <p:spPr bwMode="auto">
-          <a:xfrm>
-            <a:off x="609600" y="2209800"/>
-            <a:ext cx="7923807" cy="3505200"/>
-          </a:xfrm>
-          <a:prstGeom prst="rect">
-            <a:avLst/>
-          </a:prstGeom>
-          <a:noFill/>
-          <a:ln>
-            <a:noFill/>
-          </a:ln>
-          <a:effectLst/>
-          <a:extLst>
-            <a:ext uri="{909E8E84-426E-40DD-AFC4-6F175D3DCCD1}">
-              <a14:hiddenFill xmlns:a14="http://schemas.microsoft.com/office/drawing/2010/main">
-                <a:solidFill>
-                  <a:schemeClr val="accent1"/>
-                </a:solidFill>
-              </a14:hiddenFill>
-            </a:ext>
-            <a:ext uri="{91240B29-F687-4F45-9708-019B960494DF}">
-              <a14:hiddenLine xmlns:a14="http://schemas.microsoft.com/office/drawing/2010/main" w="9525">
-                <a:solidFill>
-                  <a:schemeClr val="tx1"/>
-                </a:solidFill>
-                <a:miter lim="800000"/>
-                <a:headEnd/>
-                <a:tailEnd/>
-              </a14:hiddenLine>
-            </a:ext>
-            <a:ext uri="{AF507438-7753-43E0-B8FC-AC1667EBCBE1}">
-              <a14:hiddenEffects xmlns:a14="http://schemas.microsoft.com/office/drawing/2010/main">
-                <a:effectLst>
-                  <a:outerShdw dist="35921" dir="2700000" algn="ctr" rotWithShape="0">
-                    <a:schemeClr val="bg2"/>
-                  </a:outerShdw>
-                </a:effectLst>
-              </a14:hiddenEffects>
-            </a:ext>
-          </a:extLst>
-        </p:spPr>
-      </p:pic>
-      <p:sp>
-        <p:nvSpPr>
-          <p:cNvPr id="7" name="Rectangle 6"/>
-          <p:cNvSpPr/>
-          <p:nvPr/>
-        </p:nvSpPr>
-        <p:spPr>
-          <a:xfrm>
-            <a:off x="457200" y="2133600"/>
-            <a:ext cx="5943600" cy="304800"/>
-          </a:xfrm>
-          <a:prstGeom prst="rect">
-            <a:avLst/>
-          </a:prstGeom>
-          <a:noFill/>
-          <a:ln w="38100">
-            <a:solidFill>
-              <a:schemeClr val="accent6"/>
-            </a:solidFill>
-          </a:ln>
-        </p:spPr>
-        <p:style>
-          <a:lnRef idx="2">
-            <a:schemeClr val="accent1">
-              <a:shade val="50000"/>
-            </a:schemeClr>
-          </a:lnRef>
-          <a:fillRef idx="1">
-            <a:schemeClr val="accent1"/>
-          </a:fillRef>
-          <a:effectRef idx="0">
-            <a:schemeClr val="accent1"/>
-          </a:effectRef>
-          <a:fontRef idx="minor">
-            <a:schemeClr val="lt1"/>
-          </a:fontRef>
-        </p:style>
-        <p:txBody>
-          <a:bodyPr rtlCol="0" anchor="ctr"/>
-          <a:lstStyle/>
-          <a:p>
-            <a:pPr algn="ctr"/>
-            <a:endParaRPr lang="en-US"/>
-          </a:p>
-        </p:txBody>
-      </p:sp>
-      <p:sp>
-        <p:nvSpPr>
-          <p:cNvPr id="10" name="Rectangle 9"/>
-          <p:cNvSpPr/>
-          <p:nvPr/>
-        </p:nvSpPr>
-        <p:spPr>
-          <a:xfrm>
-            <a:off x="609600" y="2629468"/>
-            <a:ext cx="4876800" cy="1332931"/>
-          </a:xfrm>
-          <a:prstGeom prst="rect">
-            <a:avLst/>
-          </a:prstGeom>
-          <a:noFill/>
-          <a:ln w="38100">
-            <a:solidFill>
-              <a:schemeClr val="accent6"/>
-            </a:solidFill>
-          </a:ln>
-        </p:spPr>
-        <p:style>
-          <a:lnRef idx="2">
-            <a:schemeClr val="accent1">
-              <a:shade val="50000"/>
-            </a:schemeClr>
-          </a:lnRef>
-          <a:fillRef idx="1">
-            <a:schemeClr val="accent1"/>
-          </a:fillRef>
-          <a:effectRef idx="0">
-            <a:schemeClr val="accent1"/>
-          </a:effectRef>
-          <a:fontRef idx="minor">
-            <a:schemeClr val="lt1"/>
-          </a:fontRef>
-        </p:style>
-        <p:txBody>
-          <a:bodyPr rtlCol="0" anchor="ctr"/>
-          <a:lstStyle/>
-          <a:p>
-            <a:pPr algn="ctr"/>
-            <a:endParaRPr lang="en-US"/>
-          </a:p>
-        </p:txBody>
-      </p:sp>
-      <p:sp>
-        <p:nvSpPr>
-          <p:cNvPr id="8" name="ZoneTexte 7"/>
-          <p:cNvSpPr txBox="1"/>
-          <p:nvPr/>
-        </p:nvSpPr>
-        <p:spPr>
-          <a:xfrm>
-            <a:off x="6477000" y="2848506"/>
-            <a:ext cx="2438400" cy="1015663"/>
-          </a:xfrm>
-          <a:prstGeom prst="rect">
-            <a:avLst/>
-          </a:prstGeom>
-          <a:noFill/>
-          <a:ln w="38100">
-            <a:solidFill>
-              <a:schemeClr val="accent6"/>
-            </a:solidFill>
-          </a:ln>
-        </p:spPr>
-        <p:txBody>
-          <a:bodyPr wrap="square" rtlCol="0">
-            <a:spAutoFit/>
-          </a:bodyPr>
-          <a:lstStyle/>
-          <a:p>
-            <a:r>
-              <a:rPr lang="en-US" sz="2000" dirty="0" smtClean="0"/>
-              <a:t>The unit tests are generated using APT too </a:t>
-            </a:r>
-            <a:r>
-              <a:rPr lang="en-US" sz="2000" b="1" dirty="0" smtClean="0">
-                <a:sym typeface="Wingdings" pitchFamily="2" charset="2"/>
-              </a:rPr>
-              <a:t></a:t>
-            </a:r>
-            <a:endParaRPr lang="en-US" sz="2000" b="1" dirty="0"/>
-          </a:p>
-        </p:txBody>
-      </p:sp>
-      <p:cxnSp>
-        <p:nvCxnSpPr>
-          <p:cNvPr id="11" name="Connecteur droit avec flèche 10"/>
-          <p:cNvCxnSpPr>
-            <a:stCxn id="8" idx="0"/>
-            <a:endCxn id="7" idx="3"/>
-          </p:cNvCxnSpPr>
-          <p:nvPr/>
-        </p:nvCxnSpPr>
-        <p:spPr>
-          <a:xfrm flipH="1" flipV="1">
-            <a:off x="6400800" y="2286000"/>
-            <a:ext cx="1295400" cy="562506"/>
-          </a:xfrm>
-          <a:prstGeom prst="straightConnector1">
-            <a:avLst/>
-          </a:prstGeom>
-          <a:ln>
-            <a:tailEnd type="arrow"/>
-          </a:ln>
-        </p:spPr>
-        <p:style>
-          <a:lnRef idx="2">
-            <a:schemeClr val="accent6"/>
-          </a:lnRef>
-          <a:fillRef idx="0">
-            <a:schemeClr val="accent6"/>
-          </a:fillRef>
-          <a:effectRef idx="1">
-            <a:schemeClr val="accent6"/>
-          </a:effectRef>
-          <a:fontRef idx="minor">
-            <a:schemeClr val="tx1"/>
-          </a:fontRef>
-        </p:style>
-      </p:cxnSp>
-      <p:sp>
-        <p:nvSpPr>
-          <p:cNvPr id="17" name="ZoneTexte 16"/>
-          <p:cNvSpPr txBox="1"/>
-          <p:nvPr/>
-        </p:nvSpPr>
-        <p:spPr>
-          <a:xfrm>
-            <a:off x="4648200" y="4343400"/>
-            <a:ext cx="4266207" cy="1015663"/>
-          </a:xfrm>
-          <a:prstGeom prst="rect">
-            <a:avLst/>
-          </a:prstGeom>
-          <a:noFill/>
-          <a:ln w="38100">
-            <a:solidFill>
-              <a:schemeClr val="accent6"/>
-            </a:solidFill>
-          </a:ln>
-        </p:spPr>
-        <p:txBody>
-          <a:bodyPr wrap="square" rtlCol="0">
-            <a:spAutoFit/>
-          </a:bodyPr>
-          <a:lstStyle/>
-          <a:p>
-            <a:r>
-              <a:rPr lang="en-US" sz="2000" b="1" dirty="0" err="1" smtClean="0"/>
-              <a:t>MessageBundleFactory.getBundle</a:t>
-            </a:r>
-            <a:r>
-              <a:rPr lang="en-US" sz="2000" b="1" dirty="0" smtClean="0"/>
-              <a:t>(…)</a:t>
-            </a:r>
-            <a:r>
-              <a:rPr lang="en-US" sz="2000" dirty="0" smtClean="0"/>
-              <a:t> usage in the test @Before to retrieve the bundle implementation</a:t>
-            </a:r>
-            <a:endParaRPr lang="en-US" sz="2000" dirty="0"/>
-          </a:p>
-        </p:txBody>
-      </p:sp>
-      <p:cxnSp>
-        <p:nvCxnSpPr>
-          <p:cNvPr id="20" name="Connecteur droit avec flèche 19"/>
-          <p:cNvCxnSpPr>
-            <a:stCxn id="17" idx="0"/>
-            <a:endCxn id="10" idx="3"/>
-          </p:cNvCxnSpPr>
-          <p:nvPr/>
-        </p:nvCxnSpPr>
-        <p:spPr>
-          <a:xfrm flipH="1" flipV="1">
-            <a:off x="5486400" y="3295934"/>
-            <a:ext cx="1294904" cy="1047466"/>
-          </a:xfrm>
-          <a:prstGeom prst="straightConnector1">
-            <a:avLst/>
-          </a:prstGeom>
-          <a:ln>
-            <a:tailEnd type="arrow"/>
-          </a:ln>
-        </p:spPr>
-        <p:style>
-          <a:lnRef idx="2">
-            <a:schemeClr val="accent6"/>
-          </a:lnRef>
-          <a:fillRef idx="0">
-            <a:schemeClr val="accent6"/>
-          </a:fillRef>
-          <a:effectRef idx="1">
-            <a:schemeClr val="accent6"/>
-          </a:effectRef>
-          <a:fontRef idx="minor">
-            <a:schemeClr val="tx1"/>
-          </a:fontRef>
-        </p:style>
-      </p:cxnSp>
-    </p:spTree>
-    <p:extLst>
-      <p:ext uri="{BB962C8B-B14F-4D97-AF65-F5344CB8AC3E}">
-        <p14:creationId xmlns:p14="http://schemas.microsoft.com/office/powerpoint/2010/main" val="2545510818"/>
-      </p:ext>
-    </p:extLst>
-  </p:cSld>
-  <p:clrMapOvr>
-    <a:masterClrMapping/>
-  </p:clrMapOvr>
-  <p:timing>
-    <p:tnLst>
-      <p:par>
-        <p:cTn id="1" dur="indefinite" restart="never" nodeType="tmRoot"/>
-      </p:par>
-    </p:tnLst>
-  </p:timing>
-</p:sld>
-</file>
-
-<file path=ppt/slides/slide2.xml><?xml version="1.0" encoding="utf-8"?>
-<p:sld xmlns:a="http://schemas.openxmlformats.org/drawingml/2006/main" xmlns:r="http://schemas.openxmlformats.org/officeDocument/2006/relationships" xmlns:p="http://schemas.openxmlformats.org/presentationml/2006/main">
-  <p:cSld>
-    <p:spTree>
-      <p:nvGrpSpPr>
-        <p:cNvPr id="1" name=""/>
-        <p:cNvGrpSpPr/>
-        <p:nvPr/>
-      </p:nvGrpSpPr>
-      <p:grpSpPr>
-        <a:xfrm>
-          <a:off x="0" y="0"/>
-          <a:ext cx="0" cy="0"/>
-          <a:chOff x="0" y="0"/>
-          <a:chExt cx="0" cy="0"/>
-        </a:xfrm>
-      </p:grpSpPr>
-      <p:sp>
-        <p:nvSpPr>
-          <p:cNvPr id="2" name="Titre 1"/>
-          <p:cNvSpPr>
-            <a:spLocks noGrp="1"/>
-          </p:cNvSpPr>
-          <p:nvPr>
-            <p:ph type="title"/>
-          </p:nvPr>
-        </p:nvSpPr>
-        <p:spPr>
-          <a:xfrm>
-            <a:off x="457200" y="274638"/>
-            <a:ext cx="8229600" cy="792162"/>
-          </a:xfrm>
-        </p:spPr>
-        <p:txBody>
-          <a:bodyPr>
-            <a:normAutofit/>
-          </a:bodyPr>
-          <a:lstStyle/>
-          <a:p>
-            <a:r>
-              <a:rPr lang="en-US" dirty="0" smtClean="0"/>
-              <a:t>Big picture</a:t>
-            </a:r>
-            <a:endParaRPr lang="en-US" dirty="0"/>
-          </a:p>
-        </p:txBody>
-      </p:sp>
-      <p:pic>
-        <p:nvPicPr>
-          <p:cNvPr id="5" name="Espace réservé du contenu 4"/>
-          <p:cNvPicPr>
-            <a:picLocks noGrp="1" noChangeAspect="1"/>
-          </p:cNvPicPr>
-          <p:nvPr>
-            <p:ph idx="1"/>
-          </p:nvPr>
-        </p:nvPicPr>
-        <p:blipFill>
-          <a:blip r:embed="rId2">
-            <a:extLst>
-              <a:ext uri="{28A0092B-C50C-407E-A947-70E740481C1C}">
-                <a14:useLocalDpi xmlns:a14="http://schemas.microsoft.com/office/drawing/2010/main" val="0"/>
-              </a:ext>
-            </a:extLst>
-          </a:blip>
-          <a:stretch>
-            <a:fillRect/>
-          </a:stretch>
-        </p:blipFill>
-        <p:spPr>
-          <a:xfrm>
-            <a:off x="307585" y="1066800"/>
-            <a:ext cx="8684015" cy="4815681"/>
-          </a:xfrm>
-        </p:spPr>
-      </p:pic>
-    </p:spTree>
-    <p:extLst>
-      <p:ext uri="{BB962C8B-B14F-4D97-AF65-F5344CB8AC3E}">
-        <p14:creationId xmlns:p14="http://schemas.microsoft.com/office/powerpoint/2010/main" val="22109374"/>
-      </p:ext>
-    </p:extLst>
-  </p:cSld>
-  <p:clrMapOvr>
-    <a:masterClrMapping/>
-  </p:clrMapOvr>
-  <p:timing>
-    <p:tnLst>
-      <p:par>
-        <p:cTn id="1" dur="indefinite" restart="never" nodeType="tmRoot"/>
-      </p:par>
-    </p:tnLst>
-  </p:timing>
-</p:sld>
-</file>
-
-<file path=ppt/slides/slide3.xml><?xml version="1.0" encoding="utf-8"?>
-<p:sld xmlns:a="http://schemas.openxmlformats.org/drawingml/2006/main" xmlns:r="http://schemas.openxmlformats.org/officeDocument/2006/relationships" xmlns:p="http://schemas.openxmlformats.org/presentationml/2006/main">
-  <p:cSld>
-    <p:spTree>
-      <p:nvGrpSpPr>
-        <p:cNvPr id="1" name=""/>
-        <p:cNvGrpSpPr/>
-        <p:nvPr/>
-      </p:nvGrpSpPr>
-      <p:grpSpPr>
-        <a:xfrm>
-          <a:off x="0" y="0"/>
-          <a:ext cx="0" cy="0"/>
-          <a:chOff x="0" y="0"/>
-          <a:chExt cx="0" cy="0"/>
-        </a:xfrm>
-      </p:grpSpPr>
-      <p:sp>
-        <p:nvSpPr>
-          <p:cNvPr id="2" name="Titre 1"/>
-          <p:cNvSpPr>
-            <a:spLocks noGrp="1"/>
-          </p:cNvSpPr>
-          <p:nvPr>
-            <p:ph type="title"/>
-          </p:nvPr>
-        </p:nvSpPr>
-        <p:spPr/>
-        <p:txBody>
-          <a:bodyPr/>
-          <a:lstStyle/>
-          <a:p>
-            <a:r>
-              <a:rPr lang="en-US" dirty="0" smtClean="0"/>
-              <a:t>Generate the </a:t>
-            </a:r>
-            <a:r>
-              <a:rPr lang="en-US" dirty="0" err="1"/>
-              <a:t>DesktopBundle</a:t>
+              <a:t>started</a:t>
             </a:r>
             <a:endParaRPr lang="en-US" dirty="0"/>
           </a:p>
@@ -4190,6 +3522,1119 @@
 </p:sld>
 </file>
 
+<file path=ppt/slides/slide10.xml><?xml version="1.0" encoding="utf-8"?>
+<p:sld xmlns:a="http://schemas.openxmlformats.org/drawingml/2006/main" xmlns:r="http://schemas.openxmlformats.org/officeDocument/2006/relationships" xmlns:p="http://schemas.openxmlformats.org/presentationml/2006/main">
+  <p:cSld>
+    <p:spTree>
+      <p:nvGrpSpPr>
+        <p:cNvPr id="1" name=""/>
+        <p:cNvGrpSpPr/>
+        <p:nvPr/>
+      </p:nvGrpSpPr>
+      <p:grpSpPr>
+        <a:xfrm>
+          <a:off x="0" y="0"/>
+          <a:ext cx="0" cy="0"/>
+          <a:chOff x="0" y="0"/>
+          <a:chExt cx="0" cy="0"/>
+        </a:xfrm>
+      </p:grpSpPr>
+      <p:pic>
+        <p:nvPicPr>
+          <p:cNvPr id="3075" name="Picture 3"/>
+          <p:cNvPicPr>
+            <a:picLocks noChangeAspect="1" noChangeArrowheads="1"/>
+          </p:cNvPicPr>
+          <p:nvPr/>
+        </p:nvPicPr>
+        <p:blipFill>
+          <a:blip r:embed="rId2">
+            <a:extLst>
+              <a:ext uri="{28A0092B-C50C-407E-A947-70E740481C1C}">
+                <a14:useLocalDpi xmlns:a14="http://schemas.microsoft.com/office/drawing/2010/main" val="0"/>
+              </a:ext>
+            </a:extLst>
+          </a:blip>
+          <a:srcRect/>
+          <a:stretch>
+            <a:fillRect/>
+          </a:stretch>
+        </p:blipFill>
+        <p:spPr bwMode="auto">
+          <a:xfrm>
+            <a:off x="520577" y="2209800"/>
+            <a:ext cx="8090023" cy="3581400"/>
+          </a:xfrm>
+          <a:prstGeom prst="rect">
+            <a:avLst/>
+          </a:prstGeom>
+          <a:noFill/>
+          <a:ln>
+            <a:noFill/>
+          </a:ln>
+          <a:effectLst/>
+          <a:extLst>
+            <a:ext uri="{909E8E84-426E-40DD-AFC4-6F175D3DCCD1}">
+              <a14:hiddenFill xmlns:a14="http://schemas.microsoft.com/office/drawing/2010/main">
+                <a:solidFill>
+                  <a:schemeClr val="accent1"/>
+                </a:solidFill>
+              </a14:hiddenFill>
+            </a:ext>
+            <a:ext uri="{91240B29-F687-4F45-9708-019B960494DF}">
+              <a14:hiddenLine xmlns:a14="http://schemas.microsoft.com/office/drawing/2010/main" w="9525">
+                <a:solidFill>
+                  <a:schemeClr val="tx1"/>
+                </a:solidFill>
+                <a:miter lim="800000"/>
+                <a:headEnd/>
+                <a:tailEnd/>
+              </a14:hiddenLine>
+            </a:ext>
+            <a:ext uri="{AF507438-7753-43E0-B8FC-AC1667EBCBE1}">
+              <a14:hiddenEffects xmlns:a14="http://schemas.microsoft.com/office/drawing/2010/main">
+                <a:effectLst>
+                  <a:outerShdw dist="35921" dir="2700000" algn="ctr" rotWithShape="0">
+                    <a:schemeClr val="bg2"/>
+                  </a:outerShdw>
+                </a:effectLst>
+              </a14:hiddenEffects>
+            </a:ext>
+          </a:extLst>
+        </p:spPr>
+      </p:pic>
+      <p:sp>
+        <p:nvSpPr>
+          <p:cNvPr id="3" name="Espace réservé du contenu 2"/>
+          <p:cNvSpPr>
+            <a:spLocks noGrp="1"/>
+          </p:cNvSpPr>
+          <p:nvPr>
+            <p:ph idx="1"/>
+          </p:nvPr>
+        </p:nvSpPr>
+        <p:spPr>
+          <a:xfrm>
+            <a:off x="457200" y="1600201"/>
+            <a:ext cx="8229600" cy="609600"/>
+          </a:xfrm>
+        </p:spPr>
+        <p:txBody>
+          <a:bodyPr/>
+          <a:lstStyle/>
+          <a:p>
+            <a:r>
+              <a:rPr lang="en-US" dirty="0" smtClean="0"/>
+              <a:t>Some basic JUnit test using the API</a:t>
+            </a:r>
+            <a:endParaRPr lang="en-US" dirty="0"/>
+          </a:p>
+        </p:txBody>
+      </p:sp>
+      <p:sp>
+        <p:nvSpPr>
+          <p:cNvPr id="5" name="Titre 1"/>
+          <p:cNvSpPr>
+            <a:spLocks noGrp="1"/>
+          </p:cNvSpPr>
+          <p:nvPr>
+            <p:ph type="title"/>
+          </p:nvPr>
+        </p:nvSpPr>
+        <p:spPr>
+          <a:xfrm>
+            <a:off x="457200" y="274638"/>
+            <a:ext cx="8229600" cy="1143000"/>
+          </a:xfrm>
+        </p:spPr>
+        <p:txBody>
+          <a:bodyPr/>
+          <a:lstStyle/>
+          <a:p>
+            <a:r>
+              <a:rPr lang="en-US" dirty="0" smtClean="0"/>
+              <a:t>Client code </a:t>
+            </a:r>
+            <a:r>
+              <a:rPr lang="en-US" dirty="0" smtClean="0"/>
+              <a:t>sample with JUnit</a:t>
+            </a:r>
+            <a:endParaRPr lang="en-US" dirty="0"/>
+          </a:p>
+        </p:txBody>
+      </p:sp>
+      <p:sp>
+        <p:nvSpPr>
+          <p:cNvPr id="7" name="Rectangle 6"/>
+          <p:cNvSpPr/>
+          <p:nvPr/>
+        </p:nvSpPr>
+        <p:spPr>
+          <a:xfrm>
+            <a:off x="457200" y="2133600"/>
+            <a:ext cx="5943600" cy="304800"/>
+          </a:xfrm>
+          <a:prstGeom prst="rect">
+            <a:avLst/>
+          </a:prstGeom>
+          <a:noFill/>
+          <a:ln w="38100">
+            <a:solidFill>
+              <a:schemeClr val="accent6"/>
+            </a:solidFill>
+          </a:ln>
+        </p:spPr>
+        <p:style>
+          <a:lnRef idx="2">
+            <a:schemeClr val="accent1">
+              <a:shade val="50000"/>
+            </a:schemeClr>
+          </a:lnRef>
+          <a:fillRef idx="1">
+            <a:schemeClr val="accent1"/>
+          </a:fillRef>
+          <a:effectRef idx="0">
+            <a:schemeClr val="accent1"/>
+          </a:effectRef>
+          <a:fontRef idx="minor">
+            <a:schemeClr val="lt1"/>
+          </a:fontRef>
+        </p:style>
+        <p:txBody>
+          <a:bodyPr rtlCol="0" anchor="ctr"/>
+          <a:lstStyle/>
+          <a:p>
+            <a:pPr algn="ctr"/>
+            <a:endParaRPr lang="en-US"/>
+          </a:p>
+        </p:txBody>
+      </p:sp>
+      <p:sp>
+        <p:nvSpPr>
+          <p:cNvPr id="10" name="Rectangle 9"/>
+          <p:cNvSpPr/>
+          <p:nvPr/>
+        </p:nvSpPr>
+        <p:spPr>
+          <a:xfrm>
+            <a:off x="609600" y="2629468"/>
+            <a:ext cx="5410200" cy="1332931"/>
+          </a:xfrm>
+          <a:prstGeom prst="rect">
+            <a:avLst/>
+          </a:prstGeom>
+          <a:noFill/>
+          <a:ln w="38100">
+            <a:solidFill>
+              <a:schemeClr val="accent6"/>
+            </a:solidFill>
+          </a:ln>
+        </p:spPr>
+        <p:style>
+          <a:lnRef idx="2">
+            <a:schemeClr val="accent1">
+              <a:shade val="50000"/>
+            </a:schemeClr>
+          </a:lnRef>
+          <a:fillRef idx="1">
+            <a:schemeClr val="accent1"/>
+          </a:fillRef>
+          <a:effectRef idx="0">
+            <a:schemeClr val="accent1"/>
+          </a:effectRef>
+          <a:fontRef idx="minor">
+            <a:schemeClr val="lt1"/>
+          </a:fontRef>
+        </p:style>
+        <p:txBody>
+          <a:bodyPr rtlCol="0" anchor="ctr"/>
+          <a:lstStyle/>
+          <a:p>
+            <a:pPr algn="ctr"/>
+            <a:endParaRPr lang="en-US"/>
+          </a:p>
+        </p:txBody>
+      </p:sp>
+      <p:sp>
+        <p:nvSpPr>
+          <p:cNvPr id="8" name="ZoneTexte 7"/>
+          <p:cNvSpPr txBox="1"/>
+          <p:nvPr/>
+        </p:nvSpPr>
+        <p:spPr>
+          <a:xfrm>
+            <a:off x="6477000" y="2667000"/>
+            <a:ext cx="2438400" cy="1015663"/>
+          </a:xfrm>
+          <a:prstGeom prst="rect">
+            <a:avLst/>
+          </a:prstGeom>
+          <a:noFill/>
+          <a:ln w="38100">
+            <a:solidFill>
+              <a:schemeClr val="accent6"/>
+            </a:solidFill>
+          </a:ln>
+        </p:spPr>
+        <p:txBody>
+          <a:bodyPr wrap="square" rtlCol="0">
+            <a:spAutoFit/>
+          </a:bodyPr>
+          <a:lstStyle/>
+          <a:p>
+            <a:r>
+              <a:rPr lang="en-US" sz="2000" dirty="0" smtClean="0"/>
+              <a:t>The unit tests are generated using APT too </a:t>
+            </a:r>
+            <a:r>
+              <a:rPr lang="en-US" sz="2000" b="1" dirty="0" smtClean="0">
+                <a:sym typeface="Wingdings" pitchFamily="2" charset="2"/>
+              </a:rPr>
+              <a:t></a:t>
+            </a:r>
+            <a:endParaRPr lang="en-US" sz="2000" b="1" dirty="0"/>
+          </a:p>
+        </p:txBody>
+      </p:sp>
+      <p:cxnSp>
+        <p:nvCxnSpPr>
+          <p:cNvPr id="11" name="Connecteur droit avec flèche 10"/>
+          <p:cNvCxnSpPr>
+            <a:stCxn id="8" idx="0"/>
+            <a:endCxn id="7" idx="3"/>
+          </p:cNvCxnSpPr>
+          <p:nvPr/>
+        </p:nvCxnSpPr>
+        <p:spPr>
+          <a:xfrm flipH="1" flipV="1">
+            <a:off x="6400800" y="2286000"/>
+            <a:ext cx="1295400" cy="381000"/>
+          </a:xfrm>
+          <a:prstGeom prst="straightConnector1">
+            <a:avLst/>
+          </a:prstGeom>
+          <a:ln>
+            <a:tailEnd type="arrow"/>
+          </a:ln>
+        </p:spPr>
+        <p:style>
+          <a:lnRef idx="2">
+            <a:schemeClr val="accent6"/>
+          </a:lnRef>
+          <a:fillRef idx="0">
+            <a:schemeClr val="accent6"/>
+          </a:fillRef>
+          <a:effectRef idx="1">
+            <a:schemeClr val="accent6"/>
+          </a:effectRef>
+          <a:fontRef idx="minor">
+            <a:schemeClr val="tx1"/>
+          </a:fontRef>
+        </p:style>
+      </p:cxnSp>
+      <p:sp>
+        <p:nvSpPr>
+          <p:cNvPr id="17" name="ZoneTexte 16"/>
+          <p:cNvSpPr txBox="1"/>
+          <p:nvPr/>
+        </p:nvSpPr>
+        <p:spPr>
+          <a:xfrm>
+            <a:off x="4648200" y="4343400"/>
+            <a:ext cx="4266207" cy="1015663"/>
+          </a:xfrm>
+          <a:prstGeom prst="rect">
+            <a:avLst/>
+          </a:prstGeom>
+          <a:noFill/>
+          <a:ln w="38100">
+            <a:solidFill>
+              <a:schemeClr val="accent6"/>
+            </a:solidFill>
+          </a:ln>
+        </p:spPr>
+        <p:txBody>
+          <a:bodyPr wrap="square" rtlCol="0">
+            <a:spAutoFit/>
+          </a:bodyPr>
+          <a:lstStyle/>
+          <a:p>
+            <a:r>
+              <a:rPr lang="en-US" sz="2000" b="1" dirty="0" err="1" smtClean="0"/>
+              <a:t>BundleFactory.get</a:t>
+            </a:r>
+            <a:r>
+              <a:rPr lang="en-US" sz="2000" b="1" dirty="0" smtClean="0"/>
+              <a:t>(…)</a:t>
+            </a:r>
+            <a:r>
+              <a:rPr lang="en-US" sz="2000" dirty="0" smtClean="0"/>
+              <a:t> </a:t>
+            </a:r>
+            <a:r>
+              <a:rPr lang="en-US" sz="2000" dirty="0" smtClean="0"/>
+              <a:t>usage in the test @Before to retrieve the bundle implementation</a:t>
+            </a:r>
+            <a:endParaRPr lang="en-US" sz="2000" dirty="0"/>
+          </a:p>
+        </p:txBody>
+      </p:sp>
+      <p:cxnSp>
+        <p:nvCxnSpPr>
+          <p:cNvPr id="20" name="Connecteur droit avec flèche 19"/>
+          <p:cNvCxnSpPr>
+            <a:stCxn id="17" idx="0"/>
+            <a:endCxn id="10" idx="3"/>
+          </p:cNvCxnSpPr>
+          <p:nvPr/>
+        </p:nvCxnSpPr>
+        <p:spPr>
+          <a:xfrm flipH="1" flipV="1">
+            <a:off x="6019800" y="3295934"/>
+            <a:ext cx="761504" cy="1047466"/>
+          </a:xfrm>
+          <a:prstGeom prst="straightConnector1">
+            <a:avLst/>
+          </a:prstGeom>
+          <a:ln>
+            <a:tailEnd type="arrow"/>
+          </a:ln>
+        </p:spPr>
+        <p:style>
+          <a:lnRef idx="2">
+            <a:schemeClr val="accent6"/>
+          </a:lnRef>
+          <a:fillRef idx="0">
+            <a:schemeClr val="accent6"/>
+          </a:fillRef>
+          <a:effectRef idx="1">
+            <a:schemeClr val="accent6"/>
+          </a:effectRef>
+          <a:fontRef idx="minor">
+            <a:schemeClr val="tx1"/>
+          </a:fontRef>
+        </p:style>
+      </p:cxnSp>
+    </p:spTree>
+    <p:extLst>
+      <p:ext uri="{BB962C8B-B14F-4D97-AF65-F5344CB8AC3E}">
+        <p14:creationId xmlns:p14="http://schemas.microsoft.com/office/powerpoint/2010/main" val="2545510818"/>
+      </p:ext>
+    </p:extLst>
+  </p:cSld>
+  <p:clrMapOvr>
+    <a:masterClrMapping/>
+  </p:clrMapOvr>
+  <p:timing>
+    <p:tnLst>
+      <p:par>
+        <p:cTn id="1" dur="indefinite" restart="never" nodeType="tmRoot"/>
+      </p:par>
+    </p:tnLst>
+  </p:timing>
+</p:sld>
+</file>
+
+<file path=ppt/slides/slide11.xml><?xml version="1.0" encoding="utf-8"?>
+<p:sld xmlns:a="http://schemas.openxmlformats.org/drawingml/2006/main" xmlns:r="http://schemas.openxmlformats.org/officeDocument/2006/relationships" xmlns:p="http://schemas.openxmlformats.org/presentationml/2006/main">
+  <p:cSld>
+    <p:spTree>
+      <p:nvGrpSpPr>
+        <p:cNvPr id="1" name=""/>
+        <p:cNvGrpSpPr/>
+        <p:nvPr/>
+      </p:nvGrpSpPr>
+      <p:grpSpPr>
+        <a:xfrm>
+          <a:off x="0" y="0"/>
+          <a:ext cx="0" cy="0"/>
+          <a:chOff x="0" y="0"/>
+          <a:chExt cx="0" cy="0"/>
+        </a:xfrm>
+      </p:grpSpPr>
+      <p:sp>
+        <p:nvSpPr>
+          <p:cNvPr id="2" name="Titre 1"/>
+          <p:cNvSpPr>
+            <a:spLocks noGrp="1"/>
+          </p:cNvSpPr>
+          <p:nvPr>
+            <p:ph type="title"/>
+          </p:nvPr>
+        </p:nvSpPr>
+        <p:spPr/>
+        <p:txBody>
+          <a:bodyPr/>
+          <a:lstStyle/>
+          <a:p>
+            <a:r>
+              <a:rPr lang="en-US" dirty="0" smtClean="0"/>
+              <a:t>Ez18n - Summary</a:t>
+            </a:r>
+            <a:endParaRPr lang="en-US" dirty="0"/>
+          </a:p>
+        </p:txBody>
+      </p:sp>
+      <p:pic>
+        <p:nvPicPr>
+          <p:cNvPr id="4" name="Picture 3"/>
+          <p:cNvPicPr>
+            <a:picLocks noChangeAspect="1" noChangeArrowheads="1"/>
+          </p:cNvPicPr>
+          <p:nvPr/>
+        </p:nvPicPr>
+        <p:blipFill>
+          <a:blip r:embed="rId2">
+            <a:extLst>
+              <a:ext uri="{28A0092B-C50C-407E-A947-70E740481C1C}">
+                <a14:useLocalDpi xmlns:a14="http://schemas.microsoft.com/office/drawing/2010/main" val="0"/>
+              </a:ext>
+            </a:extLst>
+          </a:blip>
+          <a:srcRect/>
+          <a:stretch>
+            <a:fillRect/>
+          </a:stretch>
+        </p:blipFill>
+        <p:spPr bwMode="auto">
+          <a:xfrm>
+            <a:off x="228600" y="1371600"/>
+            <a:ext cx="3362723" cy="1858898"/>
+          </a:xfrm>
+          <a:prstGeom prst="rect">
+            <a:avLst/>
+          </a:prstGeom>
+          <a:noFill/>
+          <a:ln w="38100">
+            <a:solidFill>
+              <a:schemeClr val="accent6"/>
+            </a:solidFill>
+            <a:miter lim="800000"/>
+            <a:headEnd/>
+            <a:tailEnd/>
+          </a:ln>
+          <a:effectLst/>
+          <a:extLst>
+            <a:ext uri="{909E8E84-426E-40DD-AFC4-6F175D3DCCD1}">
+              <a14:hiddenFill xmlns:a14="http://schemas.microsoft.com/office/drawing/2010/main">
+                <a:solidFill>
+                  <a:schemeClr val="accent1"/>
+                </a:solidFill>
+              </a14:hiddenFill>
+            </a:ext>
+            <a:ext uri="{AF507438-7753-43E0-B8FC-AC1667EBCBE1}">
+              <a14:hiddenEffects xmlns:a14="http://schemas.microsoft.com/office/drawing/2010/main">
+                <a:effectLst>
+                  <a:outerShdw dist="35921" dir="2700000" algn="ctr" rotWithShape="0">
+                    <a:schemeClr val="bg2"/>
+                  </a:outerShdw>
+                </a:effectLst>
+              </a14:hiddenEffects>
+            </a:ext>
+          </a:extLst>
+        </p:spPr>
+      </p:pic>
+      <p:pic>
+        <p:nvPicPr>
+          <p:cNvPr id="1027" name="Picture 3"/>
+          <p:cNvPicPr>
+            <a:picLocks noChangeAspect="1" noChangeArrowheads="1"/>
+          </p:cNvPicPr>
+          <p:nvPr/>
+        </p:nvPicPr>
+        <p:blipFill>
+          <a:blip r:embed="rId3">
+            <a:extLst>
+              <a:ext uri="{28A0092B-C50C-407E-A947-70E740481C1C}">
+                <a14:useLocalDpi xmlns:a14="http://schemas.microsoft.com/office/drawing/2010/main" val="0"/>
+              </a:ext>
+            </a:extLst>
+          </a:blip>
+          <a:srcRect/>
+          <a:stretch>
+            <a:fillRect/>
+          </a:stretch>
+        </p:blipFill>
+        <p:spPr bwMode="auto">
+          <a:xfrm>
+            <a:off x="2288523" y="1570936"/>
+            <a:ext cx="6553993" cy="825229"/>
+          </a:xfrm>
+          <a:prstGeom prst="rect">
+            <a:avLst/>
+          </a:prstGeom>
+          <a:noFill/>
+          <a:ln w="38100">
+            <a:solidFill>
+              <a:schemeClr val="accent6"/>
+            </a:solidFill>
+            <a:miter lim="800000"/>
+            <a:headEnd/>
+            <a:tailEnd/>
+          </a:ln>
+          <a:effectLst/>
+          <a:extLst>
+            <a:ext uri="{909E8E84-426E-40DD-AFC4-6F175D3DCCD1}">
+              <a14:hiddenFill xmlns:a14="http://schemas.microsoft.com/office/drawing/2010/main">
+                <a:solidFill>
+                  <a:schemeClr val="accent1"/>
+                </a:solidFill>
+              </a14:hiddenFill>
+            </a:ext>
+            <a:ext uri="{AF507438-7753-43E0-B8FC-AC1667EBCBE1}">
+              <a14:hiddenEffects xmlns:a14="http://schemas.microsoft.com/office/drawing/2010/main">
+                <a:effectLst>
+                  <a:outerShdw dist="35921" dir="2700000" algn="ctr" rotWithShape="0">
+                    <a:schemeClr val="bg2"/>
+                  </a:outerShdw>
+                </a:effectLst>
+              </a14:hiddenEffects>
+            </a:ext>
+          </a:extLst>
+        </p:spPr>
+      </p:pic>
+      <p:cxnSp>
+        <p:nvCxnSpPr>
+          <p:cNvPr id="8" name="Connecteur en angle 7"/>
+          <p:cNvCxnSpPr>
+            <a:stCxn id="4" idx="2"/>
+            <a:endCxn id="16" idx="1"/>
+          </p:cNvCxnSpPr>
+          <p:nvPr/>
+        </p:nvCxnSpPr>
+        <p:spPr>
+          <a:xfrm rot="16200000" flipH="1">
+            <a:off x="2368325" y="2772134"/>
+            <a:ext cx="711241" cy="1627968"/>
+          </a:xfrm>
+          <a:prstGeom prst="bentConnector2">
+            <a:avLst/>
+          </a:prstGeom>
+          <a:ln>
+            <a:tailEnd type="arrow"/>
+          </a:ln>
+        </p:spPr>
+        <p:style>
+          <a:lnRef idx="2">
+            <a:schemeClr val="accent6"/>
+          </a:lnRef>
+          <a:fillRef idx="0">
+            <a:schemeClr val="accent6"/>
+          </a:fillRef>
+          <a:effectRef idx="1">
+            <a:schemeClr val="accent6"/>
+          </a:effectRef>
+          <a:fontRef idx="minor">
+            <a:schemeClr val="tx1"/>
+          </a:fontRef>
+        </p:style>
+      </p:cxnSp>
+      <p:cxnSp>
+        <p:nvCxnSpPr>
+          <p:cNvPr id="11" name="Connecteur en angle 10"/>
+          <p:cNvCxnSpPr>
+            <a:stCxn id="1027" idx="2"/>
+            <a:endCxn id="16" idx="0"/>
+          </p:cNvCxnSpPr>
+          <p:nvPr/>
+        </p:nvCxnSpPr>
+        <p:spPr>
+          <a:xfrm rot="5400000">
+            <a:off x="4532141" y="2434199"/>
+            <a:ext cx="1071413" cy="995345"/>
+          </a:xfrm>
+          <a:prstGeom prst="bentConnector3">
+            <a:avLst/>
+          </a:prstGeom>
+          <a:ln>
+            <a:tailEnd type="arrow"/>
+          </a:ln>
+        </p:spPr>
+        <p:style>
+          <a:lnRef idx="2">
+            <a:schemeClr val="accent6"/>
+          </a:lnRef>
+          <a:fillRef idx="0">
+            <a:schemeClr val="accent6"/>
+          </a:fillRef>
+          <a:effectRef idx="1">
+            <a:schemeClr val="accent6"/>
+          </a:effectRef>
+          <a:fontRef idx="minor">
+            <a:schemeClr val="tx1"/>
+          </a:fontRef>
+        </p:style>
+      </p:cxnSp>
+      <p:pic>
+        <p:nvPicPr>
+          <p:cNvPr id="1028" name="Picture 4"/>
+          <p:cNvPicPr>
+            <a:picLocks noChangeAspect="1" noChangeArrowheads="1"/>
+          </p:cNvPicPr>
+          <p:nvPr/>
+        </p:nvPicPr>
+        <p:blipFill>
+          <a:blip r:embed="rId4">
+            <a:extLst>
+              <a:ext uri="{28A0092B-C50C-407E-A947-70E740481C1C}">
+                <a14:useLocalDpi xmlns:a14="http://schemas.microsoft.com/office/drawing/2010/main" val="0"/>
+              </a:ext>
+            </a:extLst>
+          </a:blip>
+          <a:srcRect/>
+          <a:stretch>
+            <a:fillRect/>
+          </a:stretch>
+        </p:blipFill>
+        <p:spPr bwMode="auto">
+          <a:xfrm>
+            <a:off x="1514680" y="4842879"/>
+            <a:ext cx="5352168" cy="948321"/>
+          </a:xfrm>
+          <a:prstGeom prst="rect">
+            <a:avLst/>
+          </a:prstGeom>
+          <a:noFill/>
+          <a:ln w="38100">
+            <a:solidFill>
+              <a:schemeClr val="accent6"/>
+            </a:solidFill>
+            <a:miter lim="800000"/>
+            <a:headEnd/>
+            <a:tailEnd/>
+          </a:ln>
+          <a:effectLst/>
+          <a:extLst>
+            <a:ext uri="{909E8E84-426E-40DD-AFC4-6F175D3DCCD1}">
+              <a14:hiddenFill xmlns:a14="http://schemas.microsoft.com/office/drawing/2010/main">
+                <a:solidFill>
+                  <a:schemeClr val="accent1"/>
+                </a:solidFill>
+              </a14:hiddenFill>
+            </a:ext>
+            <a:ext uri="{91240B29-F687-4F45-9708-019B960494DF}">
+              <a14:hiddenLine xmlns:a14="http://schemas.microsoft.com/office/drawing/2010/main" w="9525">
+                <a:solidFill>
+                  <a:schemeClr val="tx1"/>
+                </a:solidFill>
+                <a:miter lim="800000"/>
+                <a:headEnd/>
+                <a:tailEnd/>
+              </a14:hiddenLine>
+            </a:ext>
+            <a:ext uri="{AF507438-7753-43E0-B8FC-AC1667EBCBE1}">
+              <a14:hiddenEffects xmlns:a14="http://schemas.microsoft.com/office/drawing/2010/main">
+                <a:effectLst>
+                  <a:outerShdw dist="35921" dir="2700000" algn="ctr" rotWithShape="0">
+                    <a:schemeClr val="bg2"/>
+                  </a:outerShdw>
+                </a:effectLst>
+              </a14:hiddenEffects>
+            </a:ext>
+          </a:extLst>
+        </p:spPr>
+      </p:pic>
+      <p:sp>
+        <p:nvSpPr>
+          <p:cNvPr id="16" name="Rectangle à coins arrondis 15"/>
+          <p:cNvSpPr/>
+          <p:nvPr/>
+        </p:nvSpPr>
+        <p:spPr>
+          <a:xfrm>
+            <a:off x="3537929" y="3467578"/>
+            <a:ext cx="2064490" cy="948321"/>
+          </a:xfrm>
+          <a:prstGeom prst="roundRect">
+            <a:avLst/>
+          </a:prstGeom>
+        </p:spPr>
+        <p:style>
+          <a:lnRef idx="1">
+            <a:schemeClr val="accent6"/>
+          </a:lnRef>
+          <a:fillRef idx="2">
+            <a:schemeClr val="accent6"/>
+          </a:fillRef>
+          <a:effectRef idx="1">
+            <a:schemeClr val="accent6"/>
+          </a:effectRef>
+          <a:fontRef idx="minor">
+            <a:schemeClr val="dk1"/>
+          </a:fontRef>
+        </p:style>
+        <p:txBody>
+          <a:bodyPr rtlCol="0" anchor="ctr"/>
+          <a:lstStyle/>
+          <a:p>
+            <a:pPr algn="ctr"/>
+            <a:endParaRPr lang="en-US"/>
+          </a:p>
+        </p:txBody>
+      </p:sp>
+      <p:cxnSp>
+        <p:nvCxnSpPr>
+          <p:cNvPr id="22" name="Connecteur en angle 21"/>
+          <p:cNvCxnSpPr>
+            <a:stCxn id="16" idx="2"/>
+            <a:endCxn id="1028" idx="0"/>
+          </p:cNvCxnSpPr>
+          <p:nvPr/>
+        </p:nvCxnSpPr>
+        <p:spPr>
+          <a:xfrm rot="5400000">
+            <a:off x="4166980" y="4439684"/>
+            <a:ext cx="426980" cy="379410"/>
+          </a:xfrm>
+          <a:prstGeom prst="bentConnector3">
+            <a:avLst/>
+          </a:prstGeom>
+          <a:ln>
+            <a:tailEnd type="arrow"/>
+          </a:ln>
+        </p:spPr>
+        <p:style>
+          <a:lnRef idx="2">
+            <a:schemeClr val="accent6"/>
+          </a:lnRef>
+          <a:fillRef idx="0">
+            <a:schemeClr val="accent6"/>
+          </a:fillRef>
+          <a:effectRef idx="1">
+            <a:schemeClr val="accent6"/>
+          </a:effectRef>
+          <a:fontRef idx="minor">
+            <a:schemeClr val="tx1"/>
+          </a:fontRef>
+        </p:style>
+      </p:cxnSp>
+      <p:sp>
+        <p:nvSpPr>
+          <p:cNvPr id="6" name="ZoneTexte 5"/>
+          <p:cNvSpPr txBox="1"/>
+          <p:nvPr/>
+        </p:nvSpPr>
+        <p:spPr>
+          <a:xfrm>
+            <a:off x="3682317" y="3522708"/>
+            <a:ext cx="1775717" cy="861824"/>
+          </a:xfrm>
+          <a:prstGeom prst="rect">
+            <a:avLst/>
+          </a:prstGeom>
+          <a:noFill/>
+        </p:spPr>
+        <p:txBody>
+          <a:bodyPr wrap="none" rtlCol="0">
+            <a:spAutoFit/>
+          </a:bodyPr>
+          <a:lstStyle/>
+          <a:p>
+            <a:pPr algn="ctr"/>
+            <a:r>
+              <a:rPr lang="en-US" sz="2400" b="1" dirty="0" smtClean="0"/>
+              <a:t>Maven</a:t>
+            </a:r>
+          </a:p>
+          <a:p>
+            <a:pPr algn="ctr"/>
+            <a:r>
+              <a:rPr lang="en-US" sz="2400" b="1" dirty="0" smtClean="0"/>
+              <a:t>Javac</a:t>
+            </a:r>
+            <a:r>
+              <a:rPr lang="en-US" sz="2400" b="1" dirty="0"/>
+              <a:t> </a:t>
+            </a:r>
+            <a:r>
+              <a:rPr lang="en-US" sz="2400" b="1" dirty="0" smtClean="0"/>
+              <a:t>&amp; APT</a:t>
+            </a:r>
+            <a:endParaRPr lang="en-US" sz="2400" b="1" dirty="0"/>
+          </a:p>
+        </p:txBody>
+      </p:sp>
+    </p:spTree>
+    <p:extLst>
+      <p:ext uri="{BB962C8B-B14F-4D97-AF65-F5344CB8AC3E}">
+        <p14:creationId xmlns:p14="http://schemas.microsoft.com/office/powerpoint/2010/main" val="531142822"/>
+      </p:ext>
+    </p:extLst>
+  </p:cSld>
+  <p:clrMapOvr>
+    <a:masterClrMapping/>
+  </p:clrMapOvr>
+</p:sld>
+</file>
+
+<file path=ppt/slides/slide2.xml><?xml version="1.0" encoding="utf-8"?>
+<p:sld xmlns:a="http://schemas.openxmlformats.org/drawingml/2006/main" xmlns:r="http://schemas.openxmlformats.org/officeDocument/2006/relationships" xmlns:p="http://schemas.openxmlformats.org/presentationml/2006/main">
+  <p:cSld>
+    <p:spTree>
+      <p:nvGrpSpPr>
+        <p:cNvPr id="1" name=""/>
+        <p:cNvGrpSpPr/>
+        <p:nvPr/>
+      </p:nvGrpSpPr>
+      <p:grpSpPr>
+        <a:xfrm>
+          <a:off x="0" y="0"/>
+          <a:ext cx="0" cy="0"/>
+          <a:chOff x="0" y="0"/>
+          <a:chExt cx="0" cy="0"/>
+        </a:xfrm>
+      </p:grpSpPr>
+      <p:sp>
+        <p:nvSpPr>
+          <p:cNvPr id="2" name="Titre 1"/>
+          <p:cNvSpPr>
+            <a:spLocks noGrp="1"/>
+          </p:cNvSpPr>
+          <p:nvPr>
+            <p:ph type="title"/>
+          </p:nvPr>
+        </p:nvSpPr>
+        <p:spPr>
+          <a:xfrm>
+            <a:off x="457200" y="274638"/>
+            <a:ext cx="8229600" cy="792162"/>
+          </a:xfrm>
+        </p:spPr>
+        <p:txBody>
+          <a:bodyPr>
+            <a:normAutofit/>
+          </a:bodyPr>
+          <a:lstStyle/>
+          <a:p>
+            <a:r>
+              <a:rPr lang="en-US" dirty="0" smtClean="0"/>
+              <a:t>Ez18n - Big </a:t>
+            </a:r>
+            <a:r>
+              <a:rPr lang="en-US" dirty="0" smtClean="0"/>
+              <a:t>picture</a:t>
+            </a:r>
+            <a:endParaRPr lang="en-US" dirty="0"/>
+          </a:p>
+        </p:txBody>
+      </p:sp>
+      <p:pic>
+        <p:nvPicPr>
+          <p:cNvPr id="4" name="Espace réservé du contenu 3"/>
+          <p:cNvPicPr>
+            <a:picLocks noGrp="1" noChangeAspect="1"/>
+          </p:cNvPicPr>
+          <p:nvPr>
+            <p:ph idx="1"/>
+          </p:nvPr>
+        </p:nvPicPr>
+        <p:blipFill>
+          <a:blip r:embed="rId2">
+            <a:extLst>
+              <a:ext uri="{28A0092B-C50C-407E-A947-70E740481C1C}">
+                <a14:useLocalDpi xmlns:a14="http://schemas.microsoft.com/office/drawing/2010/main" val="0"/>
+              </a:ext>
+            </a:extLst>
+          </a:blip>
+          <a:stretch>
+            <a:fillRect/>
+          </a:stretch>
+        </p:blipFill>
+        <p:spPr>
+          <a:xfrm>
+            <a:off x="228600" y="1066800"/>
+            <a:ext cx="8656821" cy="4800600"/>
+          </a:xfrm>
+        </p:spPr>
+      </p:pic>
+    </p:spTree>
+    <p:extLst>
+      <p:ext uri="{BB962C8B-B14F-4D97-AF65-F5344CB8AC3E}">
+        <p14:creationId xmlns:p14="http://schemas.microsoft.com/office/powerpoint/2010/main" val="22109374"/>
+      </p:ext>
+    </p:extLst>
+  </p:cSld>
+  <p:clrMapOvr>
+    <a:masterClrMapping/>
+  </p:clrMapOvr>
+  <p:timing>
+    <p:tnLst>
+      <p:par>
+        <p:cTn id="1" dur="indefinite" restart="never" nodeType="tmRoot"/>
+      </p:par>
+    </p:tnLst>
+  </p:timing>
+</p:sld>
+</file>
+
+<file path=ppt/slides/slide3.xml><?xml version="1.0" encoding="utf-8"?>
+<p:sld xmlns:a="http://schemas.openxmlformats.org/drawingml/2006/main" xmlns:r="http://schemas.openxmlformats.org/officeDocument/2006/relationships" xmlns:p="http://schemas.openxmlformats.org/presentationml/2006/main">
+  <p:cSld>
+    <p:spTree>
+      <p:nvGrpSpPr>
+        <p:cNvPr id="1" name=""/>
+        <p:cNvGrpSpPr/>
+        <p:nvPr/>
+      </p:nvGrpSpPr>
+      <p:grpSpPr>
+        <a:xfrm>
+          <a:off x="0" y="0"/>
+          <a:ext cx="0" cy="0"/>
+          <a:chOff x="0" y="0"/>
+          <a:chExt cx="0" cy="0"/>
+        </a:xfrm>
+      </p:grpSpPr>
+      <p:sp>
+        <p:nvSpPr>
+          <p:cNvPr id="2" name="Titre 1"/>
+          <p:cNvSpPr>
+            <a:spLocks noGrp="1"/>
+          </p:cNvSpPr>
+          <p:nvPr>
+            <p:ph type="title"/>
+          </p:nvPr>
+        </p:nvSpPr>
+        <p:spPr/>
+        <p:txBody>
+          <a:bodyPr/>
+          <a:lstStyle/>
+          <a:p>
+            <a:r>
+              <a:rPr lang="en-US" dirty="0"/>
+              <a:t>Ez18n - APT </a:t>
+            </a:r>
+            <a:r>
+              <a:rPr lang="en-US" dirty="0" smtClean="0"/>
+              <a:t>chaining</a:t>
+            </a:r>
+            <a:endParaRPr lang="en-US" dirty="0"/>
+          </a:p>
+        </p:txBody>
+      </p:sp>
+      <p:pic>
+        <p:nvPicPr>
+          <p:cNvPr id="1027" name="Picture 3"/>
+          <p:cNvPicPr>
+            <a:picLocks noChangeAspect="1" noChangeArrowheads="1"/>
+          </p:cNvPicPr>
+          <p:nvPr/>
+        </p:nvPicPr>
+        <p:blipFill>
+          <a:blip r:embed="rId2">
+            <a:extLst>
+              <a:ext uri="{28A0092B-C50C-407E-A947-70E740481C1C}">
+                <a14:useLocalDpi xmlns:a14="http://schemas.microsoft.com/office/drawing/2010/main" val="0"/>
+              </a:ext>
+            </a:extLst>
+          </a:blip>
+          <a:srcRect/>
+          <a:stretch>
+            <a:fillRect/>
+          </a:stretch>
+        </p:blipFill>
+        <p:spPr bwMode="auto">
+          <a:xfrm>
+            <a:off x="436970" y="2313737"/>
+            <a:ext cx="7183030" cy="3782263"/>
+          </a:xfrm>
+          <a:prstGeom prst="rect">
+            <a:avLst/>
+          </a:prstGeom>
+          <a:noFill/>
+          <a:ln>
+            <a:noFill/>
+          </a:ln>
+          <a:effectLst/>
+          <a:extLst>
+            <a:ext uri="{909E8E84-426E-40DD-AFC4-6F175D3DCCD1}">
+              <a14:hiddenFill xmlns:a14="http://schemas.microsoft.com/office/drawing/2010/main">
+                <a:solidFill>
+                  <a:schemeClr val="accent1"/>
+                </a:solidFill>
+              </a14:hiddenFill>
+            </a:ext>
+            <a:ext uri="{91240B29-F687-4F45-9708-019B960494DF}">
+              <a14:hiddenLine xmlns:a14="http://schemas.microsoft.com/office/drawing/2010/main" w="9525">
+                <a:solidFill>
+                  <a:schemeClr val="tx1"/>
+                </a:solidFill>
+                <a:miter lim="800000"/>
+                <a:headEnd/>
+                <a:tailEnd/>
+              </a14:hiddenLine>
+            </a:ext>
+            <a:ext uri="{AF507438-7753-43E0-B8FC-AC1667EBCBE1}">
+              <a14:hiddenEffects xmlns:a14="http://schemas.microsoft.com/office/drawing/2010/main">
+                <a:effectLst>
+                  <a:outerShdw dist="35921" dir="2700000" algn="ctr" rotWithShape="0">
+                    <a:schemeClr val="bg2"/>
+                  </a:outerShdw>
+                </a:effectLst>
+              </a14:hiddenEffects>
+            </a:ext>
+          </a:extLst>
+        </p:spPr>
+      </p:pic>
+      <p:sp>
+        <p:nvSpPr>
+          <p:cNvPr id="4" name="Espace réservé du contenu 3"/>
+          <p:cNvSpPr>
+            <a:spLocks noGrp="1"/>
+          </p:cNvSpPr>
+          <p:nvPr>
+            <p:ph idx="1"/>
+          </p:nvPr>
+        </p:nvSpPr>
+        <p:spPr>
+          <a:xfrm>
+            <a:off x="4343400" y="1600200"/>
+            <a:ext cx="4343400" cy="2057399"/>
+          </a:xfrm>
+        </p:spPr>
+        <p:txBody>
+          <a:bodyPr>
+            <a:normAutofit fontScale="92500" lnSpcReduction="20000"/>
+          </a:bodyPr>
+          <a:lstStyle/>
+          <a:p>
+            <a:r>
+              <a:rPr lang="en-US" dirty="0"/>
+              <a:t>5</a:t>
+            </a:r>
+            <a:r>
+              <a:rPr lang="en-US" dirty="0" smtClean="0"/>
+              <a:t> APT processors to obtain the default pattern</a:t>
+            </a:r>
+          </a:p>
+          <a:p>
+            <a:r>
+              <a:rPr lang="en-US" dirty="0" smtClean="0"/>
+              <a:t>Optional CSV file for analysis/tooling</a:t>
+            </a:r>
+            <a:endParaRPr lang="en-US" dirty="0"/>
+          </a:p>
+        </p:txBody>
+      </p:sp>
+    </p:spTree>
+    <p:extLst>
+      <p:ext uri="{BB962C8B-B14F-4D97-AF65-F5344CB8AC3E}">
+        <p14:creationId xmlns:p14="http://schemas.microsoft.com/office/powerpoint/2010/main" val="3547187566"/>
+      </p:ext>
+    </p:extLst>
+  </p:cSld>
+  <p:clrMapOvr>
+    <a:masterClrMapping/>
+  </p:clrMapOvr>
+  <p:timing>
+    <p:tnLst>
+      <p:par>
+        <p:cTn id="1" dur="indefinite" restart="never" nodeType="tmRoot"/>
+      </p:par>
+    </p:tnLst>
+  </p:timing>
+</p:sld>
+</file>
+
 <file path=ppt/slides/slide4.xml><?xml version="1.0" encoding="utf-8"?>
 <p:sld xmlns:a="http://schemas.openxmlformats.org/drawingml/2006/main" xmlns:r="http://schemas.openxmlformats.org/officeDocument/2006/relationships" xmlns:p="http://schemas.openxmlformats.org/presentationml/2006/main">
   <p:cSld>
@@ -4219,14 +4664,32 @@
         </p:nvSpPr>
         <p:spPr/>
         <p:txBody>
-          <a:bodyPr/>
+          <a:bodyPr>
+            <a:noAutofit/>
+          </a:bodyPr>
           <a:lstStyle/>
           <a:p>
             <a:r>
-              <a:rPr lang="en-US" dirty="0" err="1"/>
-              <a:t>DesktopBundlePropertiesProcessor</a:t>
-            </a:r>
-            <a:endParaRPr lang="en-US" dirty="0"/>
+              <a:rPr lang="en-US" sz="3200" dirty="0" smtClean="0"/>
+              <a:t>From </a:t>
+            </a:r>
+            <a:r>
+              <a:rPr lang="en-US" sz="3200" b="1" dirty="0" smtClean="0"/>
+              <a:t>Messages</a:t>
+            </a:r>
+            <a:r>
+              <a:rPr lang="en-US" sz="3200" dirty="0" smtClean="0"/>
+              <a:t> to </a:t>
+            </a:r>
+            <a:r>
+              <a:rPr lang="en-US" sz="3200" b="1" dirty="0" err="1" smtClean="0"/>
+              <a:t>DesktopMessages</a:t>
+            </a:r>
+            <a:r>
+              <a:rPr lang="en-US" sz="3200" b="1" dirty="0" err="1" smtClean="0"/>
+              <a:t>.properties</a:t>
+            </a:r>
+            <a:endParaRPr lang="en-US" sz="3200" b="1" dirty="0"/>
           </a:p>
         </p:txBody>
       </p:sp>
@@ -4750,14 +5213,28 @@
         </p:nvSpPr>
         <p:spPr/>
         <p:txBody>
-          <a:bodyPr/>
+          <a:bodyPr>
+            <a:noAutofit/>
+          </a:bodyPr>
           <a:lstStyle/>
           <a:p>
             <a:r>
-              <a:rPr lang="en-US" dirty="0" err="1"/>
-              <a:t>MobileBundlePropertiesProcessor</a:t>
-            </a:r>
-            <a:endParaRPr lang="en-US" dirty="0"/>
+              <a:rPr lang="en-US" sz="3200" dirty="0"/>
+              <a:t>From </a:t>
+            </a:r>
+            <a:r>
+              <a:rPr lang="en-US" sz="3200" b="1" dirty="0"/>
+              <a:t>Messages</a:t>
+            </a:r>
+            <a:r>
+              <a:rPr lang="en-US" sz="3200" dirty="0"/>
+              <a:t> to </a:t>
+            </a:r>
+            <a:r>
+              <a:rPr lang="en-US" sz="3200" b="1" dirty="0" err="1" smtClean="0"/>
+              <a:t>MobileMessages.properties</a:t>
+            </a:r>
+            <a:endParaRPr lang="en-US" sz="3200" dirty="0"/>
           </a:p>
         </p:txBody>
       </p:sp>
@@ -5301,26 +5778,36 @@
         </p:nvSpPr>
         <p:spPr/>
         <p:txBody>
-          <a:bodyPr/>
+          <a:bodyPr>
+            <a:noAutofit/>
+          </a:bodyPr>
           <a:lstStyle/>
           <a:p>
             <a:r>
-              <a:rPr lang="en-US" dirty="0" err="1" smtClean="0"/>
-              <a:t>DesktopBundleProcessor</a:t>
-            </a:r>
-            <a:r>
-              <a:rPr lang="en-US" dirty="0" smtClean="0"/>
-              <a:t> </a:t>
-            </a:r>
-            <a:r>
-              <a:rPr lang="en-US" sz="2400" dirty="0" smtClean="0"/>
+              <a:rPr lang="en-US" sz="3200" dirty="0"/>
+              <a:t>From </a:t>
+            </a:r>
+            <a:r>
+              <a:rPr lang="en-US" sz="3200" b="1" dirty="0"/>
+              <a:t>Messages</a:t>
+            </a:r>
+            <a:r>
+              <a:rPr lang="en-US" sz="3200" dirty="0"/>
+              <a:t> to </a:t>
+            </a:r>
+            <a:r>
+              <a:rPr lang="en-US" sz="3200" b="1" dirty="0" smtClean="0"/>
+              <a:t>MessagesDesktopBundle.java </a:t>
+            </a:r>
+            <a:r>
+              <a:rPr lang="en-US" sz="1800" dirty="0" smtClean="0"/>
               <a:t>(1/2</a:t>
             </a:r>
             <a:r>
-              <a:rPr lang="en-US" sz="2400" dirty="0"/>
+              <a:rPr lang="en-US" sz="1800" dirty="0"/>
               <a:t>)</a:t>
             </a:r>
-            <a:endParaRPr lang="en-US" dirty="0"/>
+            <a:endParaRPr lang="en-US" sz="3200" dirty="0"/>
           </a:p>
         </p:txBody>
       </p:sp>
@@ -5683,22 +6170,36 @@
         </p:nvSpPr>
         <p:spPr/>
         <p:txBody>
-          <a:bodyPr/>
+          <a:bodyPr>
+            <a:noAutofit/>
+          </a:bodyPr>
           <a:lstStyle/>
           <a:p>
             <a:r>
-              <a:rPr lang="en-US" dirty="0" err="1" smtClean="0"/>
-              <a:t>DesktopBundleProcessor</a:t>
-            </a:r>
-            <a:r>
-              <a:rPr lang="en-US" dirty="0" smtClean="0"/>
-              <a:t> </a:t>
-            </a:r>
-            <a:r>
-              <a:rPr lang="en-US" sz="2400" dirty="0" smtClean="0"/>
-              <a:t>(2/2)</a:t>
-            </a:r>
-            <a:endParaRPr lang="en-US" dirty="0"/>
+              <a:rPr lang="en-US" sz="3200" dirty="0"/>
+              <a:t>From </a:t>
+            </a:r>
+            <a:r>
+              <a:rPr lang="en-US" sz="3200" b="1" dirty="0"/>
+              <a:t>Messages</a:t>
+            </a:r>
+            <a:r>
+              <a:rPr lang="en-US" sz="3200" dirty="0"/>
+              <a:t> to </a:t>
+            </a:r>
+            <a:r>
+              <a:rPr lang="en-US" sz="3200" b="1" dirty="0" smtClean="0"/>
+              <a:t>MessagesDesktopBundle.java </a:t>
+            </a:r>
+            <a:r>
+              <a:rPr lang="en-US" sz="1800" dirty="0" smtClean="0"/>
+              <a:t>(2/2</a:t>
+            </a:r>
+            <a:r>
+              <a:rPr lang="en-US" sz="1800" dirty="0" smtClean="0"/>
+              <a:t>)</a:t>
+            </a:r>
+            <a:endParaRPr lang="en-US" sz="3200" dirty="0"/>
           </a:p>
         </p:txBody>
       </p:sp>
@@ -6070,7 +6571,7 @@
         </p:blipFill>
         <p:spPr bwMode="auto">
           <a:xfrm>
-            <a:off x="380999" y="1676400"/>
+            <a:off x="228600" y="1447800"/>
             <a:ext cx="6181725" cy="3429000"/>
           </a:xfrm>
           <a:prstGeom prst="rect">
@@ -6123,14 +6624,35 @@
         </p:nvSpPr>
         <p:spPr/>
         <p:txBody>
-          <a:bodyPr/>
+          <a:bodyPr>
+            <a:noAutofit/>
+          </a:bodyPr>
           <a:lstStyle/>
           <a:p>
             <a:r>
-              <a:rPr lang="en-US" dirty="0" smtClean="0"/>
-              <a:t>Bundle injection</a:t>
-            </a:r>
-            <a:endParaRPr lang="en-US" dirty="0"/>
+              <a:rPr lang="en-US" sz="2800" dirty="0"/>
+              <a:t>From </a:t>
+            </a:r>
+            <a:r>
+              <a:rPr lang="en-US" sz="2800" b="1" dirty="0"/>
+              <a:t>Messages</a:t>
+            </a:r>
+            <a:r>
+              <a:rPr lang="en-US" sz="2800" dirty="0"/>
+              <a:t> </a:t>
+            </a:r>
+            <a:r>
+              <a:rPr lang="en-US" sz="2800" dirty="0" smtClean="0"/>
+              <a:t>to</a:t>
+            </a:r>
+            <a:br>
+              <a:rPr lang="en-US" sz="2800" dirty="0" smtClean="0"/>
+            </a:br>
+            <a:r>
+              <a:rPr lang="en-US" sz="2800" b="1" dirty="0" smtClean="0"/>
+              <a:t>META-INF/services/org.ez18n.sample.Messages</a:t>
+            </a:r>
+            <a:endParaRPr lang="en-US" sz="2800" dirty="0"/>
           </a:p>
         </p:txBody>
       </p:sp>
@@ -6146,13 +6668,13 @@
         </p:nvSpPr>
         <p:spPr>
           <a:xfrm>
-            <a:off x="3962400" y="3390900"/>
-            <a:ext cx="4724400" cy="2735263"/>
+            <a:off x="3962400" y="2960688"/>
+            <a:ext cx="5181600" cy="3363912"/>
           </a:xfrm>
         </p:spPr>
         <p:txBody>
           <a:bodyPr>
-            <a:normAutofit fontScale="77500" lnSpcReduction="20000"/>
+            <a:normAutofit fontScale="85000" lnSpcReduction="10000"/>
           </a:bodyPr>
           <a:lstStyle/>
           <a:p>
@@ -6211,359 +6733,344 @@
           </a:p>
         </p:txBody>
       </p:sp>
-      <p:grpSp>
-        <p:nvGrpSpPr>
-          <p:cNvPr id="22" name="Groupe 21"/>
-          <p:cNvGrpSpPr/>
+      <p:sp>
+        <p:nvSpPr>
+          <p:cNvPr id="4" name="Rectangle 3"/>
+          <p:cNvSpPr/>
           <p:nvPr/>
-        </p:nvGrpSpPr>
-        <p:grpSpPr>
+        </p:nvSpPr>
+        <p:spPr>
           <a:xfrm>
-            <a:off x="1143000" y="1676400"/>
-            <a:ext cx="5419723" cy="2667000"/>
-            <a:chOff x="1143000" y="1676400"/>
-            <a:chExt cx="5419723" cy="2667000"/>
+            <a:off x="1143001" y="3733800"/>
+            <a:ext cx="1828800" cy="381000"/>
           </a:xfrm>
-        </p:grpSpPr>
-        <p:sp>
-          <p:nvSpPr>
-            <p:cNvPr id="4" name="Rectangle 3"/>
-            <p:cNvSpPr/>
-            <p:nvPr/>
-          </p:nvSpPr>
-          <p:spPr>
-            <a:xfrm>
-              <a:off x="1295400" y="3962400"/>
-              <a:ext cx="1828800" cy="381000"/>
-            </a:xfrm>
-            <a:prstGeom prst="rect">
-              <a:avLst/>
-            </a:prstGeom>
-            <a:noFill/>
-            <a:ln>
-              <a:solidFill>
-                <a:schemeClr val="accent6"/>
-              </a:solidFill>
-            </a:ln>
-          </p:spPr>
-          <p:style>
-            <a:lnRef idx="2">
-              <a:schemeClr val="accent1">
-                <a:shade val="50000"/>
-              </a:schemeClr>
-            </a:lnRef>
-            <a:fillRef idx="1">
-              <a:schemeClr val="accent1"/>
-            </a:fillRef>
-            <a:effectRef idx="0">
-              <a:schemeClr val="accent1"/>
-            </a:effectRef>
-            <a:fontRef idx="minor">
-              <a:schemeClr val="lt1"/>
-            </a:fontRef>
-          </p:style>
-          <p:txBody>
-            <a:bodyPr rtlCol="0" anchor="ctr"/>
-            <a:lstStyle/>
-            <a:p>
-              <a:pPr algn="ctr"/>
-              <a:endParaRPr lang="en-US"/>
-            </a:p>
-          </p:txBody>
-        </p:sp>
-        <p:sp>
-          <p:nvSpPr>
-            <p:cNvPr id="6" name="Rectangle 5"/>
-            <p:cNvSpPr/>
-            <p:nvPr/>
-          </p:nvSpPr>
-          <p:spPr>
-            <a:xfrm>
-              <a:off x="3733800" y="1981200"/>
-              <a:ext cx="2828923" cy="381000"/>
-            </a:xfrm>
-            <a:prstGeom prst="rect">
-              <a:avLst/>
-            </a:prstGeom>
-            <a:noFill/>
-            <a:ln>
-              <a:solidFill>
-                <a:schemeClr val="accent6"/>
-              </a:solidFill>
-            </a:ln>
-          </p:spPr>
-          <p:style>
-            <a:lnRef idx="2">
-              <a:schemeClr val="accent1">
-                <a:shade val="50000"/>
-              </a:schemeClr>
-            </a:lnRef>
-            <a:fillRef idx="1">
-              <a:schemeClr val="accent1"/>
-            </a:fillRef>
-            <a:effectRef idx="0">
-              <a:schemeClr val="accent1"/>
-            </a:effectRef>
-            <a:fontRef idx="minor">
-              <a:schemeClr val="lt1"/>
-            </a:fontRef>
-          </p:style>
-          <p:txBody>
-            <a:bodyPr rtlCol="0" anchor="ctr"/>
-            <a:lstStyle/>
-            <a:p>
-              <a:pPr algn="ctr"/>
-              <a:endParaRPr lang="en-US"/>
-            </a:p>
-          </p:txBody>
-        </p:sp>
-        <p:sp>
-          <p:nvSpPr>
-            <p:cNvPr id="7" name="Rectangle 6"/>
-            <p:cNvSpPr/>
-            <p:nvPr/>
-          </p:nvSpPr>
-          <p:spPr>
-            <a:xfrm>
-              <a:off x="1143000" y="2971800"/>
-              <a:ext cx="1828800" cy="419100"/>
-            </a:xfrm>
-            <a:prstGeom prst="rect">
-              <a:avLst/>
-            </a:prstGeom>
-            <a:noFill/>
-            <a:ln>
-              <a:solidFill>
-                <a:schemeClr val="accent6"/>
-              </a:solidFill>
-            </a:ln>
-          </p:spPr>
-          <p:style>
-            <a:lnRef idx="2">
-              <a:schemeClr val="accent1">
-                <a:shade val="50000"/>
-              </a:schemeClr>
-            </a:lnRef>
-            <a:fillRef idx="1">
-              <a:schemeClr val="accent1"/>
-            </a:fillRef>
-            <a:effectRef idx="0">
-              <a:schemeClr val="accent1"/>
-            </a:effectRef>
-            <a:fontRef idx="minor">
-              <a:schemeClr val="lt1"/>
-            </a:fontRef>
-          </p:style>
-          <p:txBody>
-            <a:bodyPr rtlCol="0" anchor="ctr"/>
-            <a:lstStyle/>
-            <a:p>
-              <a:pPr algn="ctr"/>
-              <a:endParaRPr lang="en-US"/>
-            </a:p>
-          </p:txBody>
-        </p:sp>
-        <p:sp>
-          <p:nvSpPr>
-            <p:cNvPr id="8" name="Rectangle 7"/>
-            <p:cNvSpPr/>
-            <p:nvPr/>
-          </p:nvSpPr>
-          <p:spPr>
-            <a:xfrm>
-              <a:off x="3581400" y="1676400"/>
-              <a:ext cx="2057400" cy="334926"/>
-            </a:xfrm>
-            <a:prstGeom prst="rect">
-              <a:avLst/>
-            </a:prstGeom>
-            <a:noFill/>
-            <a:ln>
-              <a:solidFill>
-                <a:schemeClr val="accent6"/>
-              </a:solidFill>
-            </a:ln>
-          </p:spPr>
-          <p:style>
-            <a:lnRef idx="2">
-              <a:schemeClr val="accent1">
-                <a:shade val="50000"/>
-              </a:schemeClr>
-            </a:lnRef>
-            <a:fillRef idx="1">
-              <a:schemeClr val="accent1"/>
-            </a:fillRef>
-            <a:effectRef idx="0">
-              <a:schemeClr val="accent1"/>
-            </a:effectRef>
-            <a:fontRef idx="minor">
-              <a:schemeClr val="lt1"/>
-            </a:fontRef>
-          </p:style>
-          <p:txBody>
-            <a:bodyPr rtlCol="0" anchor="ctr"/>
-            <a:lstStyle/>
-            <a:p>
-              <a:pPr algn="ctr"/>
-              <a:endParaRPr lang="en-US"/>
-            </a:p>
-          </p:txBody>
-        </p:sp>
-        <p:sp>
-          <p:nvSpPr>
-            <p:cNvPr id="9" name="Rectangle 8"/>
-            <p:cNvSpPr/>
-            <p:nvPr/>
-          </p:nvSpPr>
-          <p:spPr>
-            <a:xfrm>
-              <a:off x="1143000" y="2286000"/>
-              <a:ext cx="1143000" cy="222398"/>
-            </a:xfrm>
-            <a:prstGeom prst="rect">
-              <a:avLst/>
-            </a:prstGeom>
-            <a:noFill/>
-            <a:ln>
-              <a:solidFill>
-                <a:schemeClr val="accent6"/>
-              </a:solidFill>
-            </a:ln>
-          </p:spPr>
-          <p:style>
-            <a:lnRef idx="2">
-              <a:schemeClr val="accent1">
-                <a:shade val="50000"/>
-              </a:schemeClr>
-            </a:lnRef>
-            <a:fillRef idx="1">
-              <a:schemeClr val="accent1"/>
-            </a:fillRef>
-            <a:effectRef idx="0">
-              <a:schemeClr val="accent1"/>
-            </a:effectRef>
-            <a:fontRef idx="minor">
-              <a:schemeClr val="lt1"/>
-            </a:fontRef>
-          </p:style>
-          <p:txBody>
-            <a:bodyPr rtlCol="0" anchor="ctr"/>
-            <a:lstStyle/>
-            <a:p>
-              <a:pPr algn="ctr"/>
-              <a:endParaRPr lang="en-US"/>
-            </a:p>
-          </p:txBody>
-        </p:sp>
-        <p:cxnSp>
-          <p:nvCxnSpPr>
-            <p:cNvPr id="10" name="Connecteur en angle 9"/>
-            <p:cNvCxnSpPr>
-              <a:stCxn id="9" idx="3"/>
-              <a:endCxn id="8" idx="1"/>
-            </p:cNvCxnSpPr>
-            <p:nvPr/>
-          </p:nvCxnSpPr>
-          <p:spPr>
-            <a:xfrm flipV="1">
-              <a:off x="2286000" y="1843863"/>
-              <a:ext cx="1295400" cy="553336"/>
-            </a:xfrm>
-            <a:prstGeom prst="bentConnector3">
-              <a:avLst/>
-            </a:prstGeom>
-            <a:ln>
-              <a:tailEnd type="arrow"/>
-            </a:ln>
-          </p:spPr>
-          <p:style>
-            <a:lnRef idx="2">
+          <a:prstGeom prst="rect">
+            <a:avLst/>
+          </a:prstGeom>
+          <a:noFill/>
+          <a:ln>
+            <a:solidFill>
               <a:schemeClr val="accent6"/>
-            </a:lnRef>
-            <a:fillRef idx="0">
+            </a:solidFill>
+          </a:ln>
+        </p:spPr>
+        <p:style>
+          <a:lnRef idx="2">
+            <a:schemeClr val="accent1">
+              <a:shade val="50000"/>
+            </a:schemeClr>
+          </a:lnRef>
+          <a:fillRef idx="1">
+            <a:schemeClr val="accent1"/>
+          </a:fillRef>
+          <a:effectRef idx="0">
+            <a:schemeClr val="accent1"/>
+          </a:effectRef>
+          <a:fontRef idx="minor">
+            <a:schemeClr val="lt1"/>
+          </a:fontRef>
+        </p:style>
+        <p:txBody>
+          <a:bodyPr rtlCol="0" anchor="ctr"/>
+          <a:lstStyle/>
+          <a:p>
+            <a:pPr algn="ctr"/>
+            <a:endParaRPr lang="en-US" b="1"/>
+          </a:p>
+        </p:txBody>
+      </p:sp>
+      <p:sp>
+        <p:nvSpPr>
+          <p:cNvPr id="6" name="Rectangle 5"/>
+          <p:cNvSpPr/>
+          <p:nvPr/>
+        </p:nvSpPr>
+        <p:spPr>
+          <a:xfrm>
+            <a:off x="3581401" y="1752600"/>
+            <a:ext cx="2828923" cy="381000"/>
+          </a:xfrm>
+          <a:prstGeom prst="rect">
+            <a:avLst/>
+          </a:prstGeom>
+          <a:noFill/>
+          <a:ln>
+            <a:solidFill>
               <a:schemeClr val="accent6"/>
-            </a:fillRef>
-            <a:effectRef idx="1">
+            </a:solidFill>
+          </a:ln>
+        </p:spPr>
+        <p:style>
+          <a:lnRef idx="2">
+            <a:schemeClr val="accent1">
+              <a:shade val="50000"/>
+            </a:schemeClr>
+          </a:lnRef>
+          <a:fillRef idx="1">
+            <a:schemeClr val="accent1"/>
+          </a:fillRef>
+          <a:effectRef idx="0">
+            <a:schemeClr val="accent1"/>
+          </a:effectRef>
+          <a:fontRef idx="minor">
+            <a:schemeClr val="lt1"/>
+          </a:fontRef>
+        </p:style>
+        <p:txBody>
+          <a:bodyPr rtlCol="0" anchor="ctr"/>
+          <a:lstStyle/>
+          <a:p>
+            <a:pPr algn="ctr"/>
+            <a:endParaRPr lang="en-US" b="1"/>
+          </a:p>
+        </p:txBody>
+      </p:sp>
+      <p:sp>
+        <p:nvSpPr>
+          <p:cNvPr id="7" name="Rectangle 6"/>
+          <p:cNvSpPr/>
+          <p:nvPr/>
+        </p:nvSpPr>
+        <p:spPr>
+          <a:xfrm>
+            <a:off x="990601" y="2743200"/>
+            <a:ext cx="1828800" cy="419100"/>
+          </a:xfrm>
+          <a:prstGeom prst="rect">
+            <a:avLst/>
+          </a:prstGeom>
+          <a:noFill/>
+          <a:ln>
+            <a:solidFill>
               <a:schemeClr val="accent6"/>
-            </a:effectRef>
-            <a:fontRef idx="minor">
-              <a:schemeClr val="tx1"/>
-            </a:fontRef>
-          </p:style>
-        </p:cxnSp>
-        <p:cxnSp>
-          <p:nvCxnSpPr>
-            <p:cNvPr id="15" name="Connecteur en angle 14"/>
-            <p:cNvCxnSpPr>
-              <a:stCxn id="4" idx="3"/>
-              <a:endCxn id="8" idx="1"/>
-            </p:cNvCxnSpPr>
-            <p:nvPr/>
-          </p:nvCxnSpPr>
-          <p:spPr>
-            <a:xfrm flipV="1">
-              <a:off x="3124200" y="1843863"/>
-              <a:ext cx="457200" cy="2309037"/>
-            </a:xfrm>
-            <a:prstGeom prst="bentConnector3">
-              <a:avLst/>
-            </a:prstGeom>
-            <a:ln>
-              <a:tailEnd type="arrow"/>
-            </a:ln>
-          </p:spPr>
-          <p:style>
-            <a:lnRef idx="2">
+            </a:solidFill>
+          </a:ln>
+        </p:spPr>
+        <p:style>
+          <a:lnRef idx="2">
+            <a:schemeClr val="accent1">
+              <a:shade val="50000"/>
+            </a:schemeClr>
+          </a:lnRef>
+          <a:fillRef idx="1">
+            <a:schemeClr val="accent1"/>
+          </a:fillRef>
+          <a:effectRef idx="0">
+            <a:schemeClr val="accent1"/>
+          </a:effectRef>
+          <a:fontRef idx="minor">
+            <a:schemeClr val="lt1"/>
+          </a:fontRef>
+        </p:style>
+        <p:txBody>
+          <a:bodyPr rtlCol="0" anchor="ctr"/>
+          <a:lstStyle/>
+          <a:p>
+            <a:pPr algn="ctr"/>
+            <a:endParaRPr lang="en-US" b="1"/>
+          </a:p>
+        </p:txBody>
+      </p:sp>
+      <p:sp>
+        <p:nvSpPr>
+          <p:cNvPr id="8" name="Rectangle 7"/>
+          <p:cNvSpPr/>
+          <p:nvPr/>
+        </p:nvSpPr>
+        <p:spPr>
+          <a:xfrm>
+            <a:off x="3429001" y="1447800"/>
+            <a:ext cx="2057400" cy="304800"/>
+          </a:xfrm>
+          <a:prstGeom prst="rect">
+            <a:avLst/>
+          </a:prstGeom>
+          <a:noFill/>
+          <a:ln>
+            <a:solidFill>
               <a:schemeClr val="accent6"/>
-            </a:lnRef>
-            <a:fillRef idx="0">
+            </a:solidFill>
+          </a:ln>
+        </p:spPr>
+        <p:style>
+          <a:lnRef idx="2">
+            <a:schemeClr val="accent1">
+              <a:shade val="50000"/>
+            </a:schemeClr>
+          </a:lnRef>
+          <a:fillRef idx="1">
+            <a:schemeClr val="accent1"/>
+          </a:fillRef>
+          <a:effectRef idx="0">
+            <a:schemeClr val="accent1"/>
+          </a:effectRef>
+          <a:fontRef idx="minor">
+            <a:schemeClr val="lt1"/>
+          </a:fontRef>
+        </p:style>
+        <p:txBody>
+          <a:bodyPr rtlCol="0" anchor="ctr"/>
+          <a:lstStyle/>
+          <a:p>
+            <a:pPr algn="ctr"/>
+            <a:endParaRPr lang="en-US" b="1"/>
+          </a:p>
+        </p:txBody>
+      </p:sp>
+      <p:sp>
+        <p:nvSpPr>
+          <p:cNvPr id="9" name="Rectangle 8"/>
+          <p:cNvSpPr/>
+          <p:nvPr/>
+        </p:nvSpPr>
+        <p:spPr>
+          <a:xfrm>
+            <a:off x="990601" y="2057400"/>
+            <a:ext cx="1143000" cy="222398"/>
+          </a:xfrm>
+          <a:prstGeom prst="rect">
+            <a:avLst/>
+          </a:prstGeom>
+          <a:noFill/>
+          <a:ln>
+            <a:solidFill>
               <a:schemeClr val="accent6"/>
-            </a:fillRef>
-            <a:effectRef idx="1">
-              <a:schemeClr val="accent6"/>
-            </a:effectRef>
-            <a:fontRef idx="minor">
-              <a:schemeClr val="tx1"/>
-            </a:fontRef>
-          </p:style>
-        </p:cxnSp>
-        <p:cxnSp>
-          <p:nvCxnSpPr>
-            <p:cNvPr id="18" name="Connecteur en angle 17"/>
-            <p:cNvCxnSpPr>
-              <a:stCxn id="7" idx="3"/>
-              <a:endCxn id="6" idx="2"/>
-            </p:cNvCxnSpPr>
-            <p:nvPr/>
-          </p:nvCxnSpPr>
-          <p:spPr>
-            <a:xfrm flipV="1">
-              <a:off x="2971800" y="2362200"/>
-              <a:ext cx="2176462" cy="819150"/>
-            </a:xfrm>
-            <a:prstGeom prst="bentConnector2">
-              <a:avLst/>
-            </a:prstGeom>
-            <a:ln>
-              <a:tailEnd type="arrow"/>
-            </a:ln>
-          </p:spPr>
-          <p:style>
-            <a:lnRef idx="2">
-              <a:schemeClr val="accent6"/>
-            </a:lnRef>
-            <a:fillRef idx="0">
-              <a:schemeClr val="accent6"/>
-            </a:fillRef>
-            <a:effectRef idx="1">
-              <a:schemeClr val="accent6"/>
-            </a:effectRef>
-            <a:fontRef idx="minor">
-              <a:schemeClr val="tx1"/>
-            </a:fontRef>
-          </p:style>
-        </p:cxnSp>
-      </p:grpSp>
+            </a:solidFill>
+          </a:ln>
+        </p:spPr>
+        <p:style>
+          <a:lnRef idx="2">
+            <a:schemeClr val="accent1">
+              <a:shade val="50000"/>
+            </a:schemeClr>
+          </a:lnRef>
+          <a:fillRef idx="1">
+            <a:schemeClr val="accent1"/>
+          </a:fillRef>
+          <a:effectRef idx="0">
+            <a:schemeClr val="accent1"/>
+          </a:effectRef>
+          <a:fontRef idx="minor">
+            <a:schemeClr val="lt1"/>
+          </a:fontRef>
+        </p:style>
+        <p:txBody>
+          <a:bodyPr rtlCol="0" anchor="ctr"/>
+          <a:lstStyle/>
+          <a:p>
+            <a:pPr algn="ctr"/>
+            <a:endParaRPr lang="en-US" b="1"/>
+          </a:p>
+        </p:txBody>
+      </p:sp>
+      <p:cxnSp>
+        <p:nvCxnSpPr>
+          <p:cNvPr id="10" name="Connecteur en angle 9"/>
+          <p:cNvCxnSpPr>
+            <a:stCxn id="9" idx="3"/>
+            <a:endCxn id="8" idx="1"/>
+          </p:cNvCxnSpPr>
+          <p:nvPr/>
+        </p:nvCxnSpPr>
+        <p:spPr>
+          <a:xfrm flipV="1">
+            <a:off x="2133601" y="1600200"/>
+            <a:ext cx="1295400" cy="568399"/>
+          </a:xfrm>
+          <a:prstGeom prst="bentConnector3">
+            <a:avLst/>
+          </a:prstGeom>
+          <a:ln>
+            <a:tailEnd type="arrow"/>
+          </a:ln>
+        </p:spPr>
+        <p:style>
+          <a:lnRef idx="2">
+            <a:schemeClr val="accent6"/>
+          </a:lnRef>
+          <a:fillRef idx="0">
+            <a:schemeClr val="accent6"/>
+          </a:fillRef>
+          <a:effectRef idx="1">
+            <a:schemeClr val="accent6"/>
+          </a:effectRef>
+          <a:fontRef idx="minor">
+            <a:schemeClr val="tx1"/>
+          </a:fontRef>
+        </p:style>
+      </p:cxnSp>
+      <p:cxnSp>
+        <p:nvCxnSpPr>
+          <p:cNvPr id="15" name="Connecteur en angle 14"/>
+          <p:cNvCxnSpPr>
+            <a:stCxn id="4" idx="3"/>
+            <a:endCxn id="8" idx="1"/>
+          </p:cNvCxnSpPr>
+          <p:nvPr/>
+        </p:nvCxnSpPr>
+        <p:spPr>
+          <a:xfrm flipV="1">
+            <a:off x="2971801" y="1600200"/>
+            <a:ext cx="457200" cy="2324100"/>
+          </a:xfrm>
+          <a:prstGeom prst="bentConnector3">
+            <a:avLst/>
+          </a:prstGeom>
+          <a:ln>
+            <a:tailEnd type="arrow"/>
+          </a:ln>
+        </p:spPr>
+        <p:style>
+          <a:lnRef idx="2">
+            <a:schemeClr val="accent6"/>
+          </a:lnRef>
+          <a:fillRef idx="0">
+            <a:schemeClr val="accent6"/>
+          </a:fillRef>
+          <a:effectRef idx="1">
+            <a:schemeClr val="accent6"/>
+          </a:effectRef>
+          <a:fontRef idx="minor">
+            <a:schemeClr val="tx1"/>
+          </a:fontRef>
+        </p:style>
+      </p:cxnSp>
+      <p:cxnSp>
+        <p:nvCxnSpPr>
+          <p:cNvPr id="18" name="Connecteur en angle 17"/>
+          <p:cNvCxnSpPr>
+            <a:stCxn id="7" idx="3"/>
+            <a:endCxn id="6" idx="2"/>
+          </p:cNvCxnSpPr>
+          <p:nvPr/>
+        </p:nvCxnSpPr>
+        <p:spPr>
+          <a:xfrm flipV="1">
+            <a:off x="2819401" y="2133600"/>
+            <a:ext cx="2176462" cy="819150"/>
+          </a:xfrm>
+          <a:prstGeom prst="bentConnector2">
+            <a:avLst/>
+          </a:prstGeom>
+          <a:ln>
+            <a:tailEnd type="arrow"/>
+          </a:ln>
+        </p:spPr>
+        <p:style>
+          <a:lnRef idx="2">
+            <a:schemeClr val="accent6"/>
+          </a:lnRef>
+          <a:fillRef idx="0">
+            <a:schemeClr val="accent6"/>
+          </a:fillRef>
+          <a:effectRef idx="1">
+            <a:schemeClr val="accent6"/>
+          </a:effectRef>
+          <a:fontRef idx="minor">
+            <a:schemeClr val="tx1"/>
+          </a:fontRef>
+        </p:style>
+      </p:cxnSp>
     </p:spTree>
     <p:extLst>
       <p:ext uri="{BB962C8B-B14F-4D97-AF65-F5344CB8AC3E}">
@@ -6601,492 +7108,463 @@
           <a:chExt cx="0" cy="0"/>
         </a:xfrm>
       </p:grpSpPr>
-      <p:sp>
-        <p:nvSpPr>
-          <p:cNvPr id="2" name="Titre 1"/>
-          <p:cNvSpPr>
-            <a:spLocks noGrp="1"/>
-          </p:cNvSpPr>
-          <p:nvPr>
-            <p:ph type="title"/>
-          </p:nvPr>
-        </p:nvSpPr>
-        <p:spPr/>
-        <p:txBody>
-          <a:bodyPr/>
-          <a:lstStyle/>
-          <a:p>
-            <a:r>
-              <a:rPr lang="en-US" dirty="0" smtClean="0"/>
-              <a:t>Client code sample </a:t>
-            </a:r>
-            <a:r>
-              <a:rPr lang="en-US" sz="2000" dirty="0" smtClean="0"/>
-              <a:t>(1/2)</a:t>
-            </a:r>
-            <a:endParaRPr lang="en-US" dirty="0"/>
-          </a:p>
-        </p:txBody>
-      </p:sp>
-      <p:grpSp>
-        <p:nvGrpSpPr>
-          <p:cNvPr id="6188" name="Groupe 6187"/>
-          <p:cNvGrpSpPr/>
+      <p:pic>
+        <p:nvPicPr>
+          <p:cNvPr id="2050" name="Picture 2"/>
+          <p:cNvPicPr>
+            <a:picLocks noChangeAspect="1" noChangeArrowheads="1"/>
+          </p:cNvPicPr>
           <p:nvPr/>
-        </p:nvGrpSpPr>
-        <p:grpSpPr>
-          <a:xfrm>
-            <a:off x="795867" y="2590800"/>
-            <a:ext cx="7662333" cy="3429000"/>
-            <a:chOff x="1181100" y="2857500"/>
-            <a:chExt cx="6896100" cy="3086100"/>
-          </a:xfrm>
-        </p:grpSpPr>
-        <p:pic>
-          <p:nvPicPr>
-            <p:cNvPr id="6146" name="Picture 2"/>
-            <p:cNvPicPr>
-              <a:picLocks noChangeAspect="1" noChangeArrowheads="1"/>
-            </p:cNvPicPr>
-            <p:nvPr/>
-          </p:nvPicPr>
-          <p:blipFill>
-            <a:blip r:embed="rId2">
-              <a:extLst>
-                <a:ext uri="{28A0092B-C50C-407E-A947-70E740481C1C}">
-                  <a14:useLocalDpi xmlns:a14="http://schemas.microsoft.com/office/drawing/2010/main" val="0"/>
-                </a:ext>
-              </a:extLst>
-            </a:blip>
-            <a:srcRect/>
-            <a:stretch>
-              <a:fillRect/>
-            </a:stretch>
-          </p:blipFill>
-          <p:spPr bwMode="auto">
-            <a:xfrm>
-              <a:off x="1181100" y="4343400"/>
-              <a:ext cx="6896100" cy="1600200"/>
-            </a:xfrm>
-            <a:prstGeom prst="rect">
-              <a:avLst/>
-            </a:prstGeom>
-            <a:noFill/>
-            <a:ln>
-              <a:noFill/>
-            </a:ln>
-            <a:effectLst/>
+        </p:nvPicPr>
+        <p:blipFill>
+          <a:blip r:embed="rId2">
             <a:extLst>
-              <a:ext uri="{909E8E84-426E-40DD-AFC4-6F175D3DCCD1}">
-                <a14:hiddenFill xmlns:a14="http://schemas.microsoft.com/office/drawing/2010/main">
-                  <a:solidFill>
-                    <a:schemeClr val="accent1"/>
-                  </a:solidFill>
-                </a14:hiddenFill>
-              </a:ext>
-              <a:ext uri="{91240B29-F687-4F45-9708-019B960494DF}">
-                <a14:hiddenLine xmlns:a14="http://schemas.microsoft.com/office/drawing/2010/main" w="9525">
-                  <a:solidFill>
-                    <a:schemeClr val="tx1"/>
-                  </a:solidFill>
-                  <a:miter lim="800000"/>
-                  <a:headEnd/>
-                  <a:tailEnd/>
-                </a14:hiddenLine>
-              </a:ext>
-              <a:ext uri="{AF507438-7753-43E0-B8FC-AC1667EBCBE1}">
-                <a14:hiddenEffects xmlns:a14="http://schemas.microsoft.com/office/drawing/2010/main">
-                  <a:effectLst>
-                    <a:outerShdw dist="35921" dir="2700000" algn="ctr" rotWithShape="0">
-                      <a:schemeClr val="bg2"/>
-                    </a:outerShdw>
-                  </a:effectLst>
-                </a14:hiddenEffects>
+              <a:ext uri="{28A0092B-C50C-407E-A947-70E740481C1C}">
+                <a14:useLocalDpi xmlns:a14="http://schemas.microsoft.com/office/drawing/2010/main" val="0"/>
               </a:ext>
             </a:extLst>
-          </p:spPr>
-        </p:pic>
-        <p:sp>
-          <p:nvSpPr>
-            <p:cNvPr id="5" name="Accolade ouvrante 4"/>
-            <p:cNvSpPr/>
-            <p:nvPr/>
-          </p:nvSpPr>
-          <p:spPr>
-            <a:xfrm rot="5400000">
-              <a:off x="4418076" y="3901653"/>
-              <a:ext cx="155448" cy="1066800"/>
-            </a:xfrm>
-            <a:prstGeom prst="leftBrace">
-              <a:avLst/>
-            </a:prstGeom>
-          </p:spPr>
-          <p:style>
-            <a:lnRef idx="2">
-              <a:schemeClr val="accent6"/>
-            </a:lnRef>
-            <a:fillRef idx="0">
-              <a:schemeClr val="accent6"/>
-            </a:fillRef>
-            <a:effectRef idx="1">
-              <a:schemeClr val="accent6"/>
-            </a:effectRef>
-            <a:fontRef idx="minor">
-              <a:schemeClr val="tx1"/>
-            </a:fontRef>
-          </p:style>
-          <p:txBody>
-            <a:bodyPr rtlCol="0" anchor="ctr"/>
-            <a:lstStyle/>
-            <a:p>
-              <a:pPr algn="ctr"/>
-              <a:endParaRPr lang="en-US" b="1"/>
-            </a:p>
-          </p:txBody>
-        </p:sp>
-        <p:sp>
-          <p:nvSpPr>
-            <p:cNvPr id="8" name="Accolade ouvrante 7"/>
-            <p:cNvSpPr/>
-            <p:nvPr/>
-          </p:nvSpPr>
-          <p:spPr>
-            <a:xfrm rot="5400000">
-              <a:off x="6399276" y="3215853"/>
-              <a:ext cx="155448" cy="2438400"/>
-            </a:xfrm>
-            <a:prstGeom prst="leftBrace">
-              <a:avLst/>
-            </a:prstGeom>
-          </p:spPr>
-          <p:style>
-            <a:lnRef idx="2">
-              <a:schemeClr val="accent6"/>
-            </a:lnRef>
-            <a:fillRef idx="0">
-              <a:schemeClr val="accent6"/>
-            </a:fillRef>
-            <a:effectRef idx="1">
-              <a:schemeClr val="accent6"/>
-            </a:effectRef>
-            <a:fontRef idx="minor">
-              <a:schemeClr val="tx1"/>
-            </a:fontRef>
-          </p:style>
-          <p:txBody>
-            <a:bodyPr rtlCol="0" anchor="ctr"/>
-            <a:lstStyle/>
-            <a:p>
-              <a:pPr algn="ctr"/>
-              <a:endParaRPr lang="en-US" b="1"/>
-            </a:p>
-          </p:txBody>
-        </p:sp>
-        <p:pic>
-          <p:nvPicPr>
-            <p:cNvPr id="6147" name="Picture 3"/>
-            <p:cNvPicPr>
-              <a:picLocks noChangeAspect="1" noChangeArrowheads="1"/>
-            </p:cNvPicPr>
-            <p:nvPr/>
-          </p:nvPicPr>
-          <p:blipFill>
-            <a:blip r:embed="rId3">
-              <a:extLst>
-                <a:ext uri="{28A0092B-C50C-407E-A947-70E740481C1C}">
-                  <a14:useLocalDpi xmlns:a14="http://schemas.microsoft.com/office/drawing/2010/main" val="0"/>
-                </a:ext>
-              </a:extLst>
-            </a:blip>
-            <a:srcRect/>
-            <a:stretch>
-              <a:fillRect/>
-            </a:stretch>
-          </p:blipFill>
-          <p:spPr bwMode="auto">
-            <a:xfrm>
-              <a:off x="1447800" y="2897368"/>
-              <a:ext cx="2330473" cy="1288274"/>
-            </a:xfrm>
-            <a:prstGeom prst="rect">
-              <a:avLst/>
-            </a:prstGeom>
+          </a:blip>
+          <a:srcRect/>
+          <a:stretch>
+            <a:fillRect/>
+          </a:stretch>
+        </p:blipFill>
+        <p:spPr bwMode="auto">
+          <a:xfrm>
+            <a:off x="1088229" y="4267200"/>
+            <a:ext cx="7903371" cy="1742203"/>
+          </a:xfrm>
+          <a:prstGeom prst="rect">
+            <a:avLst/>
+          </a:prstGeom>
+          <a:noFill/>
+          <a:ln>
             <a:noFill/>
-            <a:ln w="38100">
-              <a:solidFill>
-                <a:schemeClr val="accent6"/>
-              </a:solidFill>
-              <a:miter lim="800000"/>
-              <a:headEnd/>
-              <a:tailEnd/>
-            </a:ln>
-            <a:effectLst/>
+          </a:ln>
+          <a:effectLst/>
+          <a:extLst>
+            <a:ext uri="{909E8E84-426E-40DD-AFC4-6F175D3DCCD1}">
+              <a14:hiddenFill xmlns:a14="http://schemas.microsoft.com/office/drawing/2010/main">
+                <a:solidFill>
+                  <a:schemeClr val="accent1"/>
+                </a:solidFill>
+              </a14:hiddenFill>
+            </a:ext>
+            <a:ext uri="{91240B29-F687-4F45-9708-019B960494DF}">
+              <a14:hiddenLine xmlns:a14="http://schemas.microsoft.com/office/drawing/2010/main" w="9525">
+                <a:solidFill>
+                  <a:schemeClr val="tx1"/>
+                </a:solidFill>
+                <a:miter lim="800000"/>
+                <a:headEnd/>
+                <a:tailEnd/>
+              </a14:hiddenLine>
+            </a:ext>
+            <a:ext uri="{AF507438-7753-43E0-B8FC-AC1667EBCBE1}">
+              <a14:hiddenEffects xmlns:a14="http://schemas.microsoft.com/office/drawing/2010/main">
+                <a:effectLst>
+                  <a:outerShdw dist="35921" dir="2700000" algn="ctr" rotWithShape="0">
+                    <a:schemeClr val="bg2"/>
+                  </a:outerShdw>
+                </a:effectLst>
+              </a14:hiddenEffects>
+            </a:ext>
+          </a:extLst>
+        </p:spPr>
+      </p:pic>
+      <p:sp>
+        <p:nvSpPr>
+          <p:cNvPr id="2" name="Titre 1"/>
+          <p:cNvSpPr>
+            <a:spLocks noGrp="1"/>
+          </p:cNvSpPr>
+          <p:nvPr>
+            <p:ph type="title"/>
+          </p:nvPr>
+        </p:nvSpPr>
+        <p:spPr/>
+        <p:txBody>
+          <a:bodyPr>
+            <a:noAutofit/>
+          </a:bodyPr>
+          <a:lstStyle/>
+          <a:p>
+            <a:r>
+              <a:rPr lang="en-US" sz="3200" dirty="0" smtClean="0"/>
+              <a:t>A factory for the </a:t>
+            </a:r>
+            <a:r>
+              <a:rPr lang="en-US" sz="3200" b="1" dirty="0" smtClean="0"/>
+              <a:t>Messages</a:t>
+            </a:r>
+            <a:r>
+              <a:rPr lang="en-US" sz="3200" dirty="0" smtClean="0"/>
+              <a:t> implementations</a:t>
+            </a:r>
+            <a:endParaRPr lang="en-US" sz="4000" dirty="0"/>
+          </a:p>
+        </p:txBody>
+      </p:sp>
+      <p:sp>
+        <p:nvSpPr>
+          <p:cNvPr id="5" name="Accolade ouvrante 4"/>
+          <p:cNvSpPr/>
+          <p:nvPr/>
+        </p:nvSpPr>
+        <p:spPr>
+          <a:xfrm rot="5400000">
+            <a:off x="4392507" y="3750970"/>
+            <a:ext cx="172720" cy="1185333"/>
+          </a:xfrm>
+          <a:prstGeom prst="leftBrace">
+            <a:avLst/>
+          </a:prstGeom>
+        </p:spPr>
+        <p:style>
+          <a:lnRef idx="2">
+            <a:schemeClr val="accent6"/>
+          </a:lnRef>
+          <a:fillRef idx="0">
+            <a:schemeClr val="accent6"/>
+          </a:fillRef>
+          <a:effectRef idx="1">
+            <a:schemeClr val="accent6"/>
+          </a:effectRef>
+          <a:fontRef idx="minor">
+            <a:schemeClr val="tx1"/>
+          </a:fontRef>
+        </p:style>
+        <p:txBody>
+          <a:bodyPr rtlCol="0" anchor="ctr"/>
+          <a:lstStyle/>
+          <a:p>
+            <a:pPr algn="ctr"/>
+            <a:endParaRPr lang="en-US" b="1"/>
+          </a:p>
+        </p:txBody>
+      </p:sp>
+      <p:sp>
+        <p:nvSpPr>
+          <p:cNvPr id="8" name="Accolade ouvrante 7"/>
+          <p:cNvSpPr/>
+          <p:nvPr/>
+        </p:nvSpPr>
+        <p:spPr>
+          <a:xfrm rot="5400000">
+            <a:off x="6593840" y="2988970"/>
+            <a:ext cx="172720" cy="2709333"/>
+          </a:xfrm>
+          <a:prstGeom prst="leftBrace">
+            <a:avLst/>
+          </a:prstGeom>
+        </p:spPr>
+        <p:style>
+          <a:lnRef idx="2">
+            <a:schemeClr val="accent6"/>
+          </a:lnRef>
+          <a:fillRef idx="0">
+            <a:schemeClr val="accent6"/>
+          </a:fillRef>
+          <a:effectRef idx="1">
+            <a:schemeClr val="accent6"/>
+          </a:effectRef>
+          <a:fontRef idx="minor">
+            <a:schemeClr val="tx1"/>
+          </a:fontRef>
+        </p:style>
+        <p:txBody>
+          <a:bodyPr rtlCol="0" anchor="ctr"/>
+          <a:lstStyle/>
+          <a:p>
+            <a:pPr algn="ctr"/>
+            <a:endParaRPr lang="en-US" b="1"/>
+          </a:p>
+        </p:txBody>
+      </p:sp>
+      <p:pic>
+        <p:nvPicPr>
+          <p:cNvPr id="6147" name="Picture 3"/>
+          <p:cNvPicPr>
+            <a:picLocks noChangeAspect="1" noChangeArrowheads="1"/>
+          </p:cNvPicPr>
+          <p:nvPr/>
+        </p:nvPicPr>
+        <p:blipFill>
+          <a:blip r:embed="rId3">
             <a:extLst>
-              <a:ext uri="{909E8E84-426E-40DD-AFC4-6F175D3DCCD1}">
-                <a14:hiddenFill xmlns:a14="http://schemas.microsoft.com/office/drawing/2010/main">
-                  <a:solidFill>
-                    <a:schemeClr val="accent1"/>
-                  </a:solidFill>
-                </a14:hiddenFill>
-              </a:ext>
-              <a:ext uri="{AF507438-7753-43E0-B8FC-AC1667EBCBE1}">
-                <a14:hiddenEffects xmlns:a14="http://schemas.microsoft.com/office/drawing/2010/main">
-                  <a:effectLst>
-                    <a:outerShdw dist="35921" dir="2700000" algn="ctr" rotWithShape="0">
-                      <a:schemeClr val="bg2"/>
-                    </a:outerShdw>
-                  </a:effectLst>
-                </a14:hiddenEffects>
+              <a:ext uri="{28A0092B-C50C-407E-A947-70E740481C1C}">
+                <a14:useLocalDpi xmlns:a14="http://schemas.microsoft.com/office/drawing/2010/main" val="0"/>
               </a:ext>
             </a:extLst>
-          </p:spPr>
-        </p:pic>
-        <p:cxnSp>
-          <p:nvCxnSpPr>
-            <p:cNvPr id="10" name="Connecteur droit avec flèche 9"/>
-            <p:cNvCxnSpPr>
-              <a:stCxn id="6147" idx="3"/>
-              <a:endCxn id="5" idx="1"/>
-            </p:cNvCxnSpPr>
-            <p:nvPr/>
-          </p:nvCxnSpPr>
-          <p:spPr>
-            <a:xfrm>
-              <a:off x="3778273" y="3541505"/>
-              <a:ext cx="717527" cy="815824"/>
-            </a:xfrm>
-            <a:prstGeom prst="straightConnector1">
-              <a:avLst/>
-            </a:prstGeom>
-            <a:ln>
-              <a:tailEnd type="arrow"/>
-            </a:ln>
-          </p:spPr>
-          <p:style>
-            <a:lnRef idx="2">
+          </a:blip>
+          <a:srcRect/>
+          <a:stretch>
+            <a:fillRect/>
+          </a:stretch>
+        </p:blipFill>
+        <p:spPr bwMode="auto">
+          <a:xfrm>
+            <a:off x="1092200" y="2635098"/>
+            <a:ext cx="2589414" cy="1431416"/>
+          </a:xfrm>
+          <a:prstGeom prst="rect">
+            <a:avLst/>
+          </a:prstGeom>
+          <a:noFill/>
+          <a:ln w="38100">
+            <a:solidFill>
               <a:schemeClr val="accent6"/>
-            </a:lnRef>
-            <a:fillRef idx="0">
-              <a:schemeClr val="accent6"/>
-            </a:fillRef>
-            <a:effectRef idx="1">
-              <a:schemeClr val="accent6"/>
-            </a:effectRef>
-            <a:fontRef idx="minor">
-              <a:schemeClr val="tx1"/>
-            </a:fontRef>
-          </p:style>
-        </p:cxnSp>
-        <p:pic>
-          <p:nvPicPr>
-            <p:cNvPr id="6148" name="Picture 4"/>
-            <p:cNvPicPr>
-              <a:picLocks noChangeAspect="1" noChangeArrowheads="1"/>
-            </p:cNvPicPr>
-            <p:nvPr/>
-          </p:nvPicPr>
-          <p:blipFill>
-            <a:blip r:embed="rId4">
-              <a:extLst>
-                <a:ext uri="{28A0092B-C50C-407E-A947-70E740481C1C}">
-                  <a14:useLocalDpi xmlns:a14="http://schemas.microsoft.com/office/drawing/2010/main" val="0"/>
-                </a:ext>
-              </a:extLst>
-            </a:blip>
-            <a:srcRect/>
-            <a:stretch>
-              <a:fillRect/>
-            </a:stretch>
-          </p:blipFill>
-          <p:spPr bwMode="auto">
-            <a:xfrm>
-              <a:off x="4191000" y="3424732"/>
-              <a:ext cx="2004060" cy="464820"/>
-            </a:xfrm>
-            <a:prstGeom prst="rect">
-              <a:avLst/>
-            </a:prstGeom>
-            <a:noFill/>
-            <a:ln w="38100">
-              <a:solidFill>
-                <a:schemeClr val="accent6"/>
-              </a:solidFill>
-              <a:miter lim="800000"/>
-              <a:headEnd/>
-              <a:tailEnd/>
-            </a:ln>
-            <a:effectLst/>
+            </a:solidFill>
+            <a:miter lim="800000"/>
+            <a:headEnd/>
+            <a:tailEnd/>
+          </a:ln>
+          <a:effectLst/>
+          <a:extLst>
+            <a:ext uri="{909E8E84-426E-40DD-AFC4-6F175D3DCCD1}">
+              <a14:hiddenFill xmlns:a14="http://schemas.microsoft.com/office/drawing/2010/main">
+                <a:solidFill>
+                  <a:schemeClr val="accent1"/>
+                </a:solidFill>
+              </a14:hiddenFill>
+            </a:ext>
+            <a:ext uri="{AF507438-7753-43E0-B8FC-AC1667EBCBE1}">
+              <a14:hiddenEffects xmlns:a14="http://schemas.microsoft.com/office/drawing/2010/main">
+                <a:effectLst>
+                  <a:outerShdw dist="35921" dir="2700000" algn="ctr" rotWithShape="0">
+                    <a:schemeClr val="bg2"/>
+                  </a:outerShdw>
+                </a:effectLst>
+              </a14:hiddenEffects>
+            </a:ext>
+          </a:extLst>
+        </p:spPr>
+      </p:pic>
+      <p:cxnSp>
+        <p:nvCxnSpPr>
+          <p:cNvPr id="10" name="Connecteur droit avec flèche 9"/>
+          <p:cNvCxnSpPr>
+            <a:stCxn id="6147" idx="3"/>
+            <a:endCxn id="5" idx="1"/>
+          </p:cNvCxnSpPr>
+          <p:nvPr/>
+        </p:nvCxnSpPr>
+        <p:spPr>
+          <a:xfrm>
+            <a:off x="3681615" y="3350806"/>
+            <a:ext cx="797252" cy="906471"/>
+          </a:xfrm>
+          <a:prstGeom prst="straightConnector1">
+            <a:avLst/>
+          </a:prstGeom>
+          <a:ln>
+            <a:tailEnd type="arrow"/>
+          </a:ln>
+        </p:spPr>
+        <p:style>
+          <a:lnRef idx="2">
+            <a:schemeClr val="accent6"/>
+          </a:lnRef>
+          <a:fillRef idx="0">
+            <a:schemeClr val="accent6"/>
+          </a:fillRef>
+          <a:effectRef idx="1">
+            <a:schemeClr val="accent6"/>
+          </a:effectRef>
+          <a:fontRef idx="minor">
+            <a:schemeClr val="tx1"/>
+          </a:fontRef>
+        </p:style>
+      </p:cxnSp>
+      <p:pic>
+        <p:nvPicPr>
+          <p:cNvPr id="6148" name="Picture 4"/>
+          <p:cNvPicPr>
+            <a:picLocks noChangeAspect="1" noChangeArrowheads="1"/>
+          </p:cNvPicPr>
+          <p:nvPr/>
+        </p:nvPicPr>
+        <p:blipFill>
+          <a:blip r:embed="rId4">
             <a:extLst>
-              <a:ext uri="{909E8E84-426E-40DD-AFC4-6F175D3DCCD1}">
-                <a14:hiddenFill xmlns:a14="http://schemas.microsoft.com/office/drawing/2010/main">
-                  <a:solidFill>
-                    <a:schemeClr val="accent1"/>
-                  </a:solidFill>
-                </a14:hiddenFill>
-              </a:ext>
-              <a:ext uri="{91240B29-F687-4F45-9708-019B960494DF}">
-                <a14:hiddenLine xmlns:a14="http://schemas.microsoft.com/office/drawing/2010/main" w="9525">
-                  <a:solidFill>
-                    <a:schemeClr val="tx1"/>
-                  </a:solidFill>
-                  <a:miter lim="800000"/>
-                  <a:headEnd/>
-                  <a:tailEnd/>
-                </a14:hiddenLine>
-              </a:ext>
-              <a:ext uri="{AF507438-7753-43E0-B8FC-AC1667EBCBE1}">
-                <a14:hiddenEffects xmlns:a14="http://schemas.microsoft.com/office/drawing/2010/main">
-                  <a:effectLst>
-                    <a:outerShdw dist="35921" dir="2700000" algn="ctr" rotWithShape="0">
-                      <a:schemeClr val="bg2"/>
-                    </a:outerShdw>
-                  </a:effectLst>
-                </a14:hiddenEffects>
+              <a:ext uri="{28A0092B-C50C-407E-A947-70E740481C1C}">
+                <a14:useLocalDpi xmlns:a14="http://schemas.microsoft.com/office/drawing/2010/main" val="0"/>
               </a:ext>
             </a:extLst>
-          </p:spPr>
-        </p:pic>
-        <p:pic>
-          <p:nvPicPr>
-            <p:cNvPr id="6150" name="Picture 6"/>
-            <p:cNvPicPr>
-              <a:picLocks noChangeAspect="1" noChangeArrowheads="1"/>
-            </p:cNvPicPr>
-            <p:nvPr/>
-          </p:nvPicPr>
-          <p:blipFill>
-            <a:blip r:embed="rId5">
-              <a:extLst>
-                <a:ext uri="{28A0092B-C50C-407E-A947-70E740481C1C}">
-                  <a14:useLocalDpi xmlns:a14="http://schemas.microsoft.com/office/drawing/2010/main" val="0"/>
-                </a:ext>
-              </a:extLst>
-            </a:blip>
-            <a:srcRect/>
-            <a:stretch>
-              <a:fillRect/>
-            </a:stretch>
-          </p:blipFill>
-          <p:spPr bwMode="auto">
-            <a:xfrm>
-              <a:off x="4238625" y="2857500"/>
-              <a:ext cx="1965960" cy="419100"/>
-            </a:xfrm>
-            <a:prstGeom prst="rect">
-              <a:avLst/>
-            </a:prstGeom>
-            <a:noFill/>
-            <a:ln w="38100">
-              <a:solidFill>
-                <a:schemeClr val="accent6"/>
-              </a:solidFill>
-              <a:miter lim="800000"/>
-              <a:headEnd/>
-              <a:tailEnd/>
-            </a:ln>
-            <a:effectLst/>
+          </a:blip>
+          <a:srcRect/>
+          <a:stretch>
+            <a:fillRect/>
+          </a:stretch>
+        </p:blipFill>
+        <p:spPr bwMode="auto">
+          <a:xfrm>
+            <a:off x="4140200" y="3221058"/>
+            <a:ext cx="2226733" cy="516467"/>
+          </a:xfrm>
+          <a:prstGeom prst="rect">
+            <a:avLst/>
+          </a:prstGeom>
+          <a:noFill/>
+          <a:ln w="38100">
+            <a:solidFill>
+              <a:schemeClr val="accent6"/>
+            </a:solidFill>
+            <a:miter lim="800000"/>
+            <a:headEnd/>
+            <a:tailEnd/>
+          </a:ln>
+          <a:effectLst/>
+          <a:extLst>
+            <a:ext uri="{909E8E84-426E-40DD-AFC4-6F175D3DCCD1}">
+              <a14:hiddenFill xmlns:a14="http://schemas.microsoft.com/office/drawing/2010/main">
+                <a:solidFill>
+                  <a:schemeClr val="accent1"/>
+                </a:solidFill>
+              </a14:hiddenFill>
+            </a:ext>
+            <a:ext uri="{AF507438-7753-43E0-B8FC-AC1667EBCBE1}">
+              <a14:hiddenEffects xmlns:a14="http://schemas.microsoft.com/office/drawing/2010/main">
+                <a:effectLst>
+                  <a:outerShdw dist="35921" dir="2700000" algn="ctr" rotWithShape="0">
+                    <a:schemeClr val="bg2"/>
+                  </a:outerShdw>
+                </a:effectLst>
+              </a14:hiddenEffects>
+            </a:ext>
+          </a:extLst>
+        </p:spPr>
+      </p:pic>
+      <p:pic>
+        <p:nvPicPr>
+          <p:cNvPr id="6150" name="Picture 6"/>
+          <p:cNvPicPr>
+            <a:picLocks noChangeAspect="1" noChangeArrowheads="1"/>
+          </p:cNvPicPr>
+          <p:nvPr/>
+        </p:nvPicPr>
+        <p:blipFill>
+          <a:blip r:embed="rId5">
             <a:extLst>
-              <a:ext uri="{909E8E84-426E-40DD-AFC4-6F175D3DCCD1}">
-                <a14:hiddenFill xmlns:a14="http://schemas.microsoft.com/office/drawing/2010/main">
-                  <a:solidFill>
-                    <a:schemeClr val="accent1"/>
-                  </a:solidFill>
-                </a14:hiddenFill>
-              </a:ext>
-              <a:ext uri="{91240B29-F687-4F45-9708-019B960494DF}">
-                <a14:hiddenLine xmlns:a14="http://schemas.microsoft.com/office/drawing/2010/main" w="9525">
-                  <a:solidFill>
-                    <a:schemeClr val="tx1"/>
-                  </a:solidFill>
-                  <a:miter lim="800000"/>
-                  <a:headEnd/>
-                  <a:tailEnd/>
-                </a14:hiddenLine>
-              </a:ext>
-              <a:ext uri="{AF507438-7753-43E0-B8FC-AC1667EBCBE1}">
-                <a14:hiddenEffects xmlns:a14="http://schemas.microsoft.com/office/drawing/2010/main">
-                  <a:effectLst>
-                    <a:outerShdw dist="35921" dir="2700000" algn="ctr" rotWithShape="0">
-                      <a:schemeClr val="bg2"/>
-                    </a:outerShdw>
-                  </a:effectLst>
-                </a14:hiddenEffects>
+              <a:ext uri="{28A0092B-C50C-407E-A947-70E740481C1C}">
+                <a14:useLocalDpi xmlns:a14="http://schemas.microsoft.com/office/drawing/2010/main" val="0"/>
               </a:ext>
             </a:extLst>
-          </p:spPr>
-        </p:pic>
-        <p:cxnSp>
-          <p:nvCxnSpPr>
-            <p:cNvPr id="22" name="Connecteur en angle 21"/>
-            <p:cNvCxnSpPr>
-              <a:stCxn id="6150" idx="3"/>
-              <a:endCxn id="8" idx="1"/>
-            </p:cNvCxnSpPr>
-            <p:nvPr/>
-          </p:nvCxnSpPr>
-          <p:spPr>
-            <a:xfrm>
-              <a:off x="6204585" y="3067050"/>
-              <a:ext cx="272415" cy="1290279"/>
-            </a:xfrm>
-            <a:prstGeom prst="bentConnector2">
-              <a:avLst/>
-            </a:prstGeom>
-            <a:ln>
-              <a:tailEnd type="arrow"/>
-            </a:ln>
-          </p:spPr>
-          <p:style>
-            <a:lnRef idx="2">
+          </a:blip>
+          <a:srcRect/>
+          <a:stretch>
+            <a:fillRect/>
+          </a:stretch>
+        </p:blipFill>
+        <p:spPr bwMode="auto">
+          <a:xfrm>
+            <a:off x="4193117" y="2590800"/>
+            <a:ext cx="2184400" cy="465667"/>
+          </a:xfrm>
+          <a:prstGeom prst="rect">
+            <a:avLst/>
+          </a:prstGeom>
+          <a:noFill/>
+          <a:ln w="38100">
+            <a:solidFill>
               <a:schemeClr val="accent6"/>
-            </a:lnRef>
-            <a:fillRef idx="0">
-              <a:schemeClr val="accent6"/>
-            </a:fillRef>
-            <a:effectRef idx="1">
-              <a:schemeClr val="accent6"/>
-            </a:effectRef>
-            <a:fontRef idx="minor">
-              <a:schemeClr val="tx1"/>
-            </a:fontRef>
-          </p:style>
-        </p:cxnSp>
-        <p:cxnSp>
-          <p:nvCxnSpPr>
-            <p:cNvPr id="6184" name="Connecteur en angle 6183"/>
-            <p:cNvCxnSpPr>
-              <a:stCxn id="6148" idx="3"/>
-            </p:cNvCxnSpPr>
-            <p:nvPr/>
-          </p:nvCxnSpPr>
-          <p:spPr>
-            <a:xfrm>
-              <a:off x="6195060" y="3657142"/>
-              <a:ext cx="281940" cy="686258"/>
-            </a:xfrm>
-            <a:prstGeom prst="bentConnector2">
-              <a:avLst/>
-            </a:prstGeom>
-            <a:ln>
-              <a:tailEnd type="arrow"/>
-            </a:ln>
-          </p:spPr>
-          <p:style>
-            <a:lnRef idx="2">
-              <a:schemeClr val="accent6"/>
-            </a:lnRef>
-            <a:fillRef idx="0">
-              <a:schemeClr val="accent6"/>
-            </a:fillRef>
-            <a:effectRef idx="1">
-              <a:schemeClr val="accent6"/>
-            </a:effectRef>
-            <a:fontRef idx="minor">
-              <a:schemeClr val="tx1"/>
-            </a:fontRef>
-          </p:style>
-        </p:cxnSp>
-      </p:grpSp>
+            </a:solidFill>
+            <a:miter lim="800000"/>
+            <a:headEnd/>
+            <a:tailEnd/>
+          </a:ln>
+          <a:effectLst/>
+          <a:extLst>
+            <a:ext uri="{909E8E84-426E-40DD-AFC4-6F175D3DCCD1}">
+              <a14:hiddenFill xmlns:a14="http://schemas.microsoft.com/office/drawing/2010/main">
+                <a:solidFill>
+                  <a:schemeClr val="accent1"/>
+                </a:solidFill>
+              </a14:hiddenFill>
+            </a:ext>
+            <a:ext uri="{AF507438-7753-43E0-B8FC-AC1667EBCBE1}">
+              <a14:hiddenEffects xmlns:a14="http://schemas.microsoft.com/office/drawing/2010/main">
+                <a:effectLst>
+                  <a:outerShdw dist="35921" dir="2700000" algn="ctr" rotWithShape="0">
+                    <a:schemeClr val="bg2"/>
+                  </a:outerShdw>
+                </a:effectLst>
+              </a14:hiddenEffects>
+            </a:ext>
+          </a:extLst>
+        </p:spPr>
+      </p:pic>
+      <p:cxnSp>
+        <p:nvCxnSpPr>
+          <p:cNvPr id="22" name="Connecteur en angle 21"/>
+          <p:cNvCxnSpPr>
+            <a:stCxn id="6150" idx="3"/>
+            <a:endCxn id="8" idx="1"/>
+          </p:cNvCxnSpPr>
+          <p:nvPr/>
+        </p:nvCxnSpPr>
+        <p:spPr>
+          <a:xfrm>
+            <a:off x="6377517" y="2823633"/>
+            <a:ext cx="302683" cy="1433643"/>
+          </a:xfrm>
+          <a:prstGeom prst="bentConnector2">
+            <a:avLst/>
+          </a:prstGeom>
+          <a:ln>
+            <a:tailEnd type="arrow"/>
+          </a:ln>
+        </p:spPr>
+        <p:style>
+          <a:lnRef idx="2">
+            <a:schemeClr val="accent6"/>
+          </a:lnRef>
+          <a:fillRef idx="0">
+            <a:schemeClr val="accent6"/>
+          </a:fillRef>
+          <a:effectRef idx="1">
+            <a:schemeClr val="accent6"/>
+          </a:effectRef>
+          <a:fontRef idx="minor">
+            <a:schemeClr val="tx1"/>
+          </a:fontRef>
+        </p:style>
+      </p:cxnSp>
+      <p:cxnSp>
+        <p:nvCxnSpPr>
+          <p:cNvPr id="6184" name="Connecteur en angle 6183"/>
+          <p:cNvCxnSpPr>
+            <a:stCxn id="6148" idx="3"/>
+          </p:cNvCxnSpPr>
+          <p:nvPr/>
+        </p:nvCxnSpPr>
+        <p:spPr>
+          <a:xfrm>
+            <a:off x="6366933" y="3479291"/>
+            <a:ext cx="313267" cy="762509"/>
+          </a:xfrm>
+          <a:prstGeom prst="bentConnector2">
+            <a:avLst/>
+          </a:prstGeom>
+          <a:ln>
+            <a:tailEnd type="arrow"/>
+          </a:ln>
+        </p:spPr>
+        <p:style>
+          <a:lnRef idx="2">
+            <a:schemeClr val="accent6"/>
+          </a:lnRef>
+          <a:fillRef idx="0">
+            <a:schemeClr val="accent6"/>
+          </a:fillRef>
+          <a:effectRef idx="1">
+            <a:schemeClr val="accent6"/>
+          </a:effectRef>
+          <a:fontRef idx="minor">
+            <a:schemeClr val="tx1"/>
+          </a:fontRef>
+        </p:style>
+      </p:cxnSp>
       <p:sp>
         <p:nvSpPr>
           <p:cNvPr id="75" name="Espace réservé du contenu 2"/>

</xml_diff>